<commit_message>
Big update to slides
</commit_message>
<xml_diff>
--- a/Paper/Slides/SlideFigures/InterestRateExposureChannel.pptx
+++ b/Paper/Slides/SlideFigures/InterestRateExposureChannel.pptx
@@ -114,713 +114,6 @@
 </p:presentation>
 </file>
 
-<file path=ppt/changesInfos/changesInfo1.xml><?xml version="1.0" encoding="utf-8"?>
-<pc:chgInfo xmlns:a="http://schemas.openxmlformats.org/drawingml/2006/main" xmlns:r="http://schemas.openxmlformats.org/officeDocument/2006/relationships" xmlns:ac="http://schemas.microsoft.com/office/drawing/2013/main/command" xmlns:pc="http://schemas.microsoft.com/office/powerpoint/2013/main/command">
-  <pc:docChgLst>
-    <pc:chgData name="Edmund Crawley" userId="5604ff08deb8de49" providerId="LiveId" clId="{AD5C14C3-8D77-4BFF-AAAD-F45DD473A74C}"/>
-    <pc:docChg chg="undo custSel addSld modSld sldOrd">
-      <pc:chgData name="Edmund Crawley" userId="5604ff08deb8de49" providerId="LiveId" clId="{AD5C14C3-8D77-4BFF-AAAD-F45DD473A74C}" dt="2018-09-10T22:12:35.208" v="516" actId="114"/>
-      <pc:docMkLst>
-        <pc:docMk/>
-      </pc:docMkLst>
-      <pc:sldChg chg="addSp delSp modSp delAnim modAnim">
-        <pc:chgData name="Edmund Crawley" userId="5604ff08deb8de49" providerId="LiveId" clId="{AD5C14C3-8D77-4BFF-AAAD-F45DD473A74C}" dt="2018-09-10T21:32:33.847" v="367" actId="14100"/>
-        <pc:sldMkLst>
-          <pc:docMk/>
-          <pc:sldMk cId="3987087717" sldId="257"/>
-        </pc:sldMkLst>
-        <pc:spChg chg="add mod">
-          <ac:chgData name="Edmund Crawley" userId="5604ff08deb8de49" providerId="LiveId" clId="{AD5C14C3-8D77-4BFF-AAAD-F45DD473A74C}" dt="2018-09-10T21:30:48.320" v="349" actId="1076"/>
-          <ac:spMkLst>
-            <pc:docMk/>
-            <pc:sldMk cId="3987087717" sldId="257"/>
-            <ac:spMk id="11" creationId="{DB87F4E0-1086-412F-B4CB-382126F1C85F}"/>
-          </ac:spMkLst>
-        </pc:spChg>
-        <pc:spChg chg="add del mod">
-          <ac:chgData name="Edmund Crawley" userId="5604ff08deb8de49" providerId="LiveId" clId="{AD5C14C3-8D77-4BFF-AAAD-F45DD473A74C}" dt="2018-09-10T21:32:04.544" v="362" actId="478"/>
-          <ac:spMkLst>
-            <pc:docMk/>
-            <pc:sldMk cId="3987087717" sldId="257"/>
-            <ac:spMk id="12" creationId="{8FB1A18B-75F7-4BF1-9BD4-3A373BCD96DF}"/>
-          </ac:spMkLst>
-        </pc:spChg>
-        <pc:spChg chg="add del">
-          <ac:chgData name="Edmund Crawley" userId="5604ff08deb8de49" providerId="LiveId" clId="{AD5C14C3-8D77-4BFF-AAAD-F45DD473A74C}" dt="2018-09-10T21:30:58.254" v="351"/>
-          <ac:spMkLst>
-            <pc:docMk/>
-            <pc:sldMk cId="3987087717" sldId="257"/>
-            <ac:spMk id="13" creationId="{66CC7F85-B6E8-4BE6-A958-AA489C683544}"/>
-          </ac:spMkLst>
-        </pc:spChg>
-        <pc:spChg chg="add del">
-          <ac:chgData name="Edmund Crawley" userId="5604ff08deb8de49" providerId="LiveId" clId="{AD5C14C3-8D77-4BFF-AAAD-F45DD473A74C}" dt="2018-09-10T21:30:58.254" v="351"/>
-          <ac:spMkLst>
-            <pc:docMk/>
-            <pc:sldMk cId="3987087717" sldId="257"/>
-            <ac:spMk id="14" creationId="{69DCAF0B-60AD-4B43-BFF1-44F11A8C52C0}"/>
-          </ac:spMkLst>
-        </pc:spChg>
-        <pc:spChg chg="add mod">
-          <ac:chgData name="Edmund Crawley" userId="5604ff08deb8de49" providerId="LiveId" clId="{AD5C14C3-8D77-4BFF-AAAD-F45DD473A74C}" dt="2018-09-10T21:31:13.506" v="354" actId="1076"/>
-          <ac:spMkLst>
-            <pc:docMk/>
-            <pc:sldMk cId="3987087717" sldId="257"/>
-            <ac:spMk id="15" creationId="{1EC07ACC-245B-412D-948E-C5B79CC954B0}"/>
-          </ac:spMkLst>
-        </pc:spChg>
-        <pc:spChg chg="add mod">
-          <ac:chgData name="Edmund Crawley" userId="5604ff08deb8de49" providerId="LiveId" clId="{AD5C14C3-8D77-4BFF-AAAD-F45DD473A74C}" dt="2018-09-10T21:31:23.146" v="356" actId="1076"/>
-          <ac:spMkLst>
-            <pc:docMk/>
-            <pc:sldMk cId="3987087717" sldId="257"/>
-            <ac:spMk id="16" creationId="{B5F61F62-CB7C-4A89-87C7-0060A4DFC702}"/>
-          </ac:spMkLst>
-        </pc:spChg>
-        <pc:spChg chg="add mod">
-          <ac:chgData name="Edmund Crawley" userId="5604ff08deb8de49" providerId="LiveId" clId="{AD5C14C3-8D77-4BFF-AAAD-F45DD473A74C}" dt="2018-09-10T21:31:40.589" v="358" actId="1076"/>
-          <ac:spMkLst>
-            <pc:docMk/>
-            <pc:sldMk cId="3987087717" sldId="257"/>
-            <ac:spMk id="17" creationId="{FB271547-D8A5-4C5C-99E6-E5410A791409}"/>
-          </ac:spMkLst>
-        </pc:spChg>
-        <pc:spChg chg="add mod">
-          <ac:chgData name="Edmund Crawley" userId="5604ff08deb8de49" providerId="LiveId" clId="{AD5C14C3-8D77-4BFF-AAAD-F45DD473A74C}" dt="2018-09-10T21:31:57.423" v="360" actId="1076"/>
-          <ac:spMkLst>
-            <pc:docMk/>
-            <pc:sldMk cId="3987087717" sldId="257"/>
-            <ac:spMk id="18" creationId="{12DE370A-FEBA-4696-AAD0-AF64DA9AB990}"/>
-          </ac:spMkLst>
-        </pc:spChg>
-        <pc:spChg chg="add mod">
-          <ac:chgData name="Edmund Crawley" userId="5604ff08deb8de49" providerId="LiveId" clId="{AD5C14C3-8D77-4BFF-AAAD-F45DD473A74C}" dt="2018-09-10T21:32:33.847" v="367" actId="14100"/>
-          <ac:spMkLst>
-            <pc:docMk/>
-            <pc:sldMk cId="3987087717" sldId="257"/>
-            <ac:spMk id="19" creationId="{E60B1D13-7EF1-460B-A5E4-803D2A6A67C5}"/>
-          </ac:spMkLst>
-        </pc:spChg>
-        <pc:spChg chg="add mod">
-          <ac:chgData name="Edmund Crawley" userId="5604ff08deb8de49" providerId="LiveId" clId="{AD5C14C3-8D77-4BFF-AAAD-F45DD473A74C}" dt="2018-09-10T21:32:27.285" v="366" actId="1076"/>
-          <ac:spMkLst>
-            <pc:docMk/>
-            <pc:sldMk cId="3987087717" sldId="257"/>
-            <ac:spMk id="20" creationId="{9F6D2EA5-F183-4ED4-9E51-DAF651D49713}"/>
-          </ac:spMkLst>
-        </pc:spChg>
-      </pc:sldChg>
-      <pc:sldChg chg="addSp delSp modSp add ord addAnim delAnim modAnim">
-        <pc:chgData name="Edmund Crawley" userId="5604ff08deb8de49" providerId="LiveId" clId="{AD5C14C3-8D77-4BFF-AAAD-F45DD473A74C}" dt="2018-09-10T22:12:35.208" v="516" actId="114"/>
-        <pc:sldMkLst>
-          <pc:docMk/>
-          <pc:sldMk cId="3824343056" sldId="258"/>
-        </pc:sldMkLst>
-        <pc:spChg chg="del">
-          <ac:chgData name="Edmund Crawley" userId="5604ff08deb8de49" providerId="LiveId" clId="{AD5C14C3-8D77-4BFF-AAAD-F45DD473A74C}" dt="2018-09-10T16:10:45.633" v="2" actId="478"/>
-          <ac:spMkLst>
-            <pc:docMk/>
-            <pc:sldMk cId="3824343056" sldId="258"/>
-            <ac:spMk id="2" creationId="{FBF237F7-9887-42D6-821D-2DA611C66928}"/>
-          </ac:spMkLst>
-        </pc:spChg>
-        <pc:spChg chg="del">
-          <ac:chgData name="Edmund Crawley" userId="5604ff08deb8de49" providerId="LiveId" clId="{AD5C14C3-8D77-4BFF-AAAD-F45DD473A74C}" dt="2018-09-10T16:10:47.710" v="3" actId="478"/>
-          <ac:spMkLst>
-            <pc:docMk/>
-            <pc:sldMk cId="3824343056" sldId="258"/>
-            <ac:spMk id="3" creationId="{4FB65FC2-CD32-44BD-9BAF-304414C5EDAA}"/>
-          </ac:spMkLst>
-        </pc:spChg>
-        <pc:spChg chg="add mod">
-          <ac:chgData name="Edmund Crawley" userId="5604ff08deb8de49" providerId="LiveId" clId="{AD5C14C3-8D77-4BFF-AAAD-F45DD473A74C}" dt="2018-09-10T18:08:01.125" v="43" actId="14100"/>
-          <ac:spMkLst>
-            <pc:docMk/>
-            <pc:sldMk cId="3824343056" sldId="258"/>
-            <ac:spMk id="4" creationId="{A834B1E7-A1F0-4827-BDA1-A136472A582F}"/>
-          </ac:spMkLst>
-        </pc:spChg>
-        <pc:spChg chg="add mod">
-          <ac:chgData name="Edmund Crawley" userId="5604ff08deb8de49" providerId="LiveId" clId="{AD5C14C3-8D77-4BFF-AAAD-F45DD473A74C}" dt="2018-09-10T18:08:06.553" v="44" actId="14100"/>
-          <ac:spMkLst>
-            <pc:docMk/>
-            <pc:sldMk cId="3824343056" sldId="258"/>
-            <ac:spMk id="5" creationId="{FB017795-F172-4D4E-8527-ECAAD0363F1A}"/>
-          </ac:spMkLst>
-        </pc:spChg>
-        <pc:spChg chg="add del mod">
-          <ac:chgData name="Edmund Crawley" userId="5604ff08deb8de49" providerId="LiveId" clId="{AD5C14C3-8D77-4BFF-AAAD-F45DD473A74C}" dt="2018-09-10T16:11:39.663" v="9" actId="478"/>
-          <ac:spMkLst>
-            <pc:docMk/>
-            <pc:sldMk cId="3824343056" sldId="258"/>
-            <ac:spMk id="6" creationId="{5B8F851F-2CE4-4659-AAD8-BC9CF6213BAD}"/>
-          </ac:spMkLst>
-        </pc:spChg>
-        <pc:spChg chg="add del mod">
-          <ac:chgData name="Edmund Crawley" userId="5604ff08deb8de49" providerId="LiveId" clId="{AD5C14C3-8D77-4BFF-AAAD-F45DD473A74C}" dt="2018-09-10T16:12:19.454" v="16" actId="478"/>
-          <ac:spMkLst>
-            <pc:docMk/>
-            <pc:sldMk cId="3824343056" sldId="258"/>
-            <ac:spMk id="7" creationId="{A5424A73-65EE-44A7-A41F-A15D8BD65BB7}"/>
-          </ac:spMkLst>
-        </pc:spChg>
-        <pc:spChg chg="add del">
-          <ac:chgData name="Edmund Crawley" userId="5604ff08deb8de49" providerId="LiveId" clId="{AD5C14C3-8D77-4BFF-AAAD-F45DD473A74C}" dt="2018-09-10T16:10:55.742" v="5" actId="478"/>
-          <ac:spMkLst>
-            <pc:docMk/>
-            <pc:sldMk cId="3824343056" sldId="258"/>
-            <ac:spMk id="10" creationId="{5562A2C4-C78C-49C7-80FF-83207EBE53D6}"/>
-          </ac:spMkLst>
-        </pc:spChg>
-        <pc:spChg chg="add del">
-          <ac:chgData name="Edmund Crawley" userId="5604ff08deb8de49" providerId="LiveId" clId="{AD5C14C3-8D77-4BFF-AAAD-F45DD473A74C}" dt="2018-09-10T16:10:55.742" v="5" actId="478"/>
-          <ac:spMkLst>
-            <pc:docMk/>
-            <pc:sldMk cId="3824343056" sldId="258"/>
-            <ac:spMk id="11" creationId="{1EFD089D-6228-44F2-BD51-8F61DC590F28}"/>
-          </ac:spMkLst>
-        </pc:spChg>
-        <pc:spChg chg="add del mod">
-          <ac:chgData name="Edmund Crawley" userId="5604ff08deb8de49" providerId="LiveId" clId="{AD5C14C3-8D77-4BFF-AAAD-F45DD473A74C}" dt="2018-09-10T16:11:45.800" v="10" actId="478"/>
-          <ac:spMkLst>
-            <pc:docMk/>
-            <pc:sldMk cId="3824343056" sldId="258"/>
-            <ac:spMk id="12" creationId="{BA628A34-9E33-415B-A1E7-44C39C6F82D0}"/>
-          </ac:spMkLst>
-        </pc:spChg>
-        <pc:spChg chg="add del mod">
-          <ac:chgData name="Edmund Crawley" userId="5604ff08deb8de49" providerId="LiveId" clId="{AD5C14C3-8D77-4BFF-AAAD-F45DD473A74C}" dt="2018-09-10T16:12:15.402" v="15" actId="478"/>
-          <ac:spMkLst>
-            <pc:docMk/>
-            <pc:sldMk cId="3824343056" sldId="258"/>
-            <ac:spMk id="13" creationId="{E1F3DB18-104D-4A02-BCD4-2F5764BD76C5}"/>
-          </ac:spMkLst>
-        </pc:spChg>
-        <pc:spChg chg="add mod">
-          <ac:chgData name="Edmund Crawley" userId="5604ff08deb8de49" providerId="LiveId" clId="{AD5C14C3-8D77-4BFF-AAAD-F45DD473A74C}" dt="2018-09-10T21:31:01.614" v="352" actId="1076"/>
-          <ac:spMkLst>
-            <pc:docMk/>
-            <pc:sldMk cId="3824343056" sldId="258"/>
-            <ac:spMk id="14" creationId="{9F6CDF6D-0A2A-48DB-941E-D68AB4508E82}"/>
-          </ac:spMkLst>
-        </pc:spChg>
-        <pc:spChg chg="add del mod">
-          <ac:chgData name="Edmund Crawley" userId="5604ff08deb8de49" providerId="LiveId" clId="{AD5C14C3-8D77-4BFF-AAAD-F45DD473A74C}" dt="2018-09-10T16:12:36.674" v="20" actId="478"/>
-          <ac:spMkLst>
-            <pc:docMk/>
-            <pc:sldMk cId="3824343056" sldId="258"/>
-            <ac:spMk id="15" creationId="{D9AB6F7D-333B-43A1-A805-8C708BC7CFF0}"/>
-          </ac:spMkLst>
-        </pc:spChg>
-        <pc:spChg chg="add del mod">
-          <ac:chgData name="Edmund Crawley" userId="5604ff08deb8de49" providerId="LiveId" clId="{AD5C14C3-8D77-4BFF-AAAD-F45DD473A74C}" dt="2018-09-10T16:12:39.753" v="21" actId="478"/>
-          <ac:spMkLst>
-            <pc:docMk/>
-            <pc:sldMk cId="3824343056" sldId="258"/>
-            <ac:spMk id="16" creationId="{0895EBA5-2393-4A17-B785-4A14731C6804}"/>
-          </ac:spMkLst>
-        </pc:spChg>
-        <pc:spChg chg="add del mod">
-          <ac:chgData name="Edmund Crawley" userId="5604ff08deb8de49" providerId="LiveId" clId="{AD5C14C3-8D77-4BFF-AAAD-F45DD473A74C}" dt="2018-09-10T16:11:48.017" v="11" actId="478"/>
-          <ac:spMkLst>
-            <pc:docMk/>
-            <pc:sldMk cId="3824343056" sldId="258"/>
-            <ac:spMk id="18" creationId="{6460B548-1AC4-46E9-A228-CFDF92969486}"/>
-          </ac:spMkLst>
-        </pc:spChg>
-        <pc:spChg chg="add del mod">
-          <ac:chgData name="Edmund Crawley" userId="5604ff08deb8de49" providerId="LiveId" clId="{AD5C14C3-8D77-4BFF-AAAD-F45DD473A74C}" dt="2018-09-10T16:12:07.525" v="14" actId="478"/>
-          <ac:spMkLst>
-            <pc:docMk/>
-            <pc:sldMk cId="3824343056" sldId="258"/>
-            <ac:spMk id="19" creationId="{72A57D8A-A9C0-4A34-B4DC-C3BBDAFF2B9A}"/>
-          </ac:spMkLst>
-        </pc:spChg>
-        <pc:spChg chg="add del mod">
-          <ac:chgData name="Edmund Crawley" userId="5604ff08deb8de49" providerId="LiveId" clId="{AD5C14C3-8D77-4BFF-AAAD-F45DD473A74C}" dt="2018-09-10T16:12:33.077" v="19" actId="478"/>
-          <ac:spMkLst>
-            <pc:docMk/>
-            <pc:sldMk cId="3824343056" sldId="258"/>
-            <ac:spMk id="20" creationId="{AF4F1CF5-C53B-4F46-90CB-E04CC9DB52BC}"/>
-          </ac:spMkLst>
-        </pc:spChg>
-        <pc:spChg chg="add mod">
-          <ac:chgData name="Edmund Crawley" userId="5604ff08deb8de49" providerId="LiveId" clId="{AD5C14C3-8D77-4BFF-AAAD-F45DD473A74C}" dt="2018-09-10T18:09:53.118" v="107" actId="1076"/>
-          <ac:spMkLst>
-            <pc:docMk/>
-            <pc:sldMk cId="3824343056" sldId="258"/>
-            <ac:spMk id="21" creationId="{7CC902D2-2AB0-4254-B204-EFE657A96007}"/>
-          </ac:spMkLst>
-        </pc:spChg>
-        <pc:spChg chg="add mod">
-          <ac:chgData name="Edmund Crawley" userId="5604ff08deb8de49" providerId="LiveId" clId="{AD5C14C3-8D77-4BFF-AAAD-F45DD473A74C}" dt="2018-09-10T18:09:27.433" v="75" actId="207"/>
-          <ac:spMkLst>
-            <pc:docMk/>
-            <pc:sldMk cId="3824343056" sldId="258"/>
-            <ac:spMk id="22" creationId="{22EC73A1-1F35-4873-B95B-D186F7A63F8D}"/>
-          </ac:spMkLst>
-        </pc:spChg>
-        <pc:spChg chg="add mod">
-          <ac:chgData name="Edmund Crawley" userId="5604ff08deb8de49" providerId="LiveId" clId="{AD5C14C3-8D77-4BFF-AAAD-F45DD473A74C}" dt="2018-09-10T18:10:37.614" v="120" actId="1076"/>
-          <ac:spMkLst>
-            <pc:docMk/>
-            <pc:sldMk cId="3824343056" sldId="258"/>
-            <ac:spMk id="23" creationId="{72209191-38EC-4BA9-91C0-AC0B428EBB5D}"/>
-          </ac:spMkLst>
-        </pc:spChg>
-        <pc:spChg chg="add mod">
-          <ac:chgData name="Edmund Crawley" userId="5604ff08deb8de49" providerId="LiveId" clId="{AD5C14C3-8D77-4BFF-AAAD-F45DD473A74C}" dt="2018-09-10T18:11:18.829" v="130" actId="1076"/>
-          <ac:spMkLst>
-            <pc:docMk/>
-            <pc:sldMk cId="3824343056" sldId="258"/>
-            <ac:spMk id="24" creationId="{42A2BBA6-AEDB-418C-8AB6-8BBD9DA873A8}"/>
-          </ac:spMkLst>
-        </pc:spChg>
-        <pc:spChg chg="add mod">
-          <ac:chgData name="Edmund Crawley" userId="5604ff08deb8de49" providerId="LiveId" clId="{AD5C14C3-8D77-4BFF-AAAD-F45DD473A74C}" dt="2018-09-10T18:47:16.634" v="168" actId="1076"/>
-          <ac:spMkLst>
-            <pc:docMk/>
-            <pc:sldMk cId="3824343056" sldId="258"/>
-            <ac:spMk id="25" creationId="{A3720733-1A09-429B-8E95-804CC5A5FD4F}"/>
-          </ac:spMkLst>
-        </pc:spChg>
-        <pc:spChg chg="add mod">
-          <ac:chgData name="Edmund Crawley" userId="5604ff08deb8de49" providerId="LiveId" clId="{AD5C14C3-8D77-4BFF-AAAD-F45DD473A74C}" dt="2018-09-10T18:47:22.205" v="169" actId="1076"/>
-          <ac:spMkLst>
-            <pc:docMk/>
-            <pc:sldMk cId="3824343056" sldId="258"/>
-            <ac:spMk id="26" creationId="{6E9557EF-A1F6-4DAB-A5A9-94EBA0786B3E}"/>
-          </ac:spMkLst>
-        </pc:spChg>
-        <pc:spChg chg="add mod">
-          <ac:chgData name="Edmund Crawley" userId="5604ff08deb8de49" providerId="LiveId" clId="{AD5C14C3-8D77-4BFF-AAAD-F45DD473A74C}" dt="2018-09-10T18:42:16.390" v="163" actId="14100"/>
-          <ac:spMkLst>
-            <pc:docMk/>
-            <pc:sldMk cId="3824343056" sldId="258"/>
-            <ac:spMk id="27" creationId="{DE7776D1-49C6-4424-B990-212E1051C1BE}"/>
-          </ac:spMkLst>
-        </pc:spChg>
-        <pc:spChg chg="add mod">
-          <ac:chgData name="Edmund Crawley" userId="5604ff08deb8de49" providerId="LiveId" clId="{AD5C14C3-8D77-4BFF-AAAD-F45DD473A74C}" dt="2018-09-10T21:29:42.630" v="347" actId="1076"/>
-          <ac:spMkLst>
-            <pc:docMk/>
-            <pc:sldMk cId="3824343056" sldId="258"/>
-            <ac:spMk id="29" creationId="{0FBC5597-2C4A-4873-B467-17C401ABD8CB}"/>
-          </ac:spMkLst>
-        </pc:spChg>
-        <pc:spChg chg="add del mod">
-          <ac:chgData name="Edmund Crawley" userId="5604ff08deb8de49" providerId="LiveId" clId="{AD5C14C3-8D77-4BFF-AAAD-F45DD473A74C}" dt="2018-09-10T21:29:10.362" v="339" actId="1076"/>
-          <ac:spMkLst>
-            <pc:docMk/>
-            <pc:sldMk cId="3824343056" sldId="258"/>
-            <ac:spMk id="30" creationId="{6E9A9A3B-486F-417D-A1C4-58A8833384C8}"/>
-          </ac:spMkLst>
-        </pc:spChg>
-        <pc:spChg chg="add del mod">
-          <ac:chgData name="Edmund Crawley" userId="5604ff08deb8de49" providerId="LiveId" clId="{AD5C14C3-8D77-4BFF-AAAD-F45DD473A74C}" dt="2018-09-10T21:29:11.095" v="340" actId="1076"/>
-          <ac:spMkLst>
-            <pc:docMk/>
-            <pc:sldMk cId="3824343056" sldId="258"/>
-            <ac:spMk id="31" creationId="{30A30FD4-AD13-4B0E-A82E-FF74121BD447}"/>
-          </ac:spMkLst>
-        </pc:spChg>
-        <pc:spChg chg="add mod">
-          <ac:chgData name="Edmund Crawley" userId="5604ff08deb8de49" providerId="LiveId" clId="{AD5C14C3-8D77-4BFF-AAAD-F45DD473A74C}" dt="2018-09-10T21:09:23.491" v="252" actId="1037"/>
-          <ac:spMkLst>
-            <pc:docMk/>
-            <pc:sldMk cId="3824343056" sldId="258"/>
-            <ac:spMk id="32" creationId="{51207E7C-91F7-465E-9D4F-D2504D4230F5}"/>
-          </ac:spMkLst>
-        </pc:spChg>
-        <pc:spChg chg="add mod">
-          <ac:chgData name="Edmund Crawley" userId="5604ff08deb8de49" providerId="LiveId" clId="{AD5C14C3-8D77-4BFF-AAAD-F45DD473A74C}" dt="2018-09-10T21:14:49.343" v="286" actId="1038"/>
-          <ac:spMkLst>
-            <pc:docMk/>
-            <pc:sldMk cId="3824343056" sldId="258"/>
-            <ac:spMk id="33" creationId="{9A3E5827-BA3B-495B-A348-534651BEE187}"/>
-          </ac:spMkLst>
-        </pc:spChg>
-        <pc:spChg chg="add mod">
-          <ac:chgData name="Edmund Crawley" userId="5604ff08deb8de49" providerId="LiveId" clId="{AD5C14C3-8D77-4BFF-AAAD-F45DD473A74C}" dt="2018-09-10T21:12:21.824" v="281" actId="1036"/>
-          <ac:spMkLst>
-            <pc:docMk/>
-            <pc:sldMk cId="3824343056" sldId="258"/>
-            <ac:spMk id="34" creationId="{EC29A13E-4B52-4029-9D71-113B13B8E00A}"/>
-          </ac:spMkLst>
-        </pc:spChg>
-        <pc:spChg chg="add mod">
-          <ac:chgData name="Edmund Crawley" userId="5604ff08deb8de49" providerId="LiveId" clId="{AD5C14C3-8D77-4BFF-AAAD-F45DD473A74C}" dt="2018-09-10T21:12:44.528" v="285" actId="14100"/>
-          <ac:spMkLst>
-            <pc:docMk/>
-            <pc:sldMk cId="3824343056" sldId="258"/>
-            <ac:spMk id="35" creationId="{64F9C0A0-9ED9-492D-B409-2688DFB3966C}"/>
-          </ac:spMkLst>
-        </pc:spChg>
-        <pc:spChg chg="add mod">
-          <ac:chgData name="Edmund Crawley" userId="5604ff08deb8de49" providerId="LiveId" clId="{AD5C14C3-8D77-4BFF-AAAD-F45DD473A74C}" dt="2018-09-10T21:42:12.317" v="369" actId="1076"/>
-          <ac:spMkLst>
-            <pc:docMk/>
-            <pc:sldMk cId="3824343056" sldId="258"/>
-            <ac:spMk id="36" creationId="{51E978A5-2540-493E-B090-C8C9C3DEF3B3}"/>
-          </ac:spMkLst>
-        </pc:spChg>
-        <pc:spChg chg="add mod">
-          <ac:chgData name="Edmund Crawley" userId="5604ff08deb8de49" providerId="LiveId" clId="{AD5C14C3-8D77-4BFF-AAAD-F45DD473A74C}" dt="2018-09-10T21:42:12.317" v="369" actId="1076"/>
-          <ac:spMkLst>
-            <pc:docMk/>
-            <pc:sldMk cId="3824343056" sldId="258"/>
-            <ac:spMk id="37" creationId="{023F5BAE-119B-406F-8ACA-3651433283B8}"/>
-          </ac:spMkLst>
-        </pc:spChg>
-        <pc:spChg chg="add mod">
-          <ac:chgData name="Edmund Crawley" userId="5604ff08deb8de49" providerId="LiveId" clId="{AD5C14C3-8D77-4BFF-AAAD-F45DD473A74C}" dt="2018-09-10T21:42:12.317" v="369" actId="1076"/>
-          <ac:spMkLst>
-            <pc:docMk/>
-            <pc:sldMk cId="3824343056" sldId="258"/>
-            <ac:spMk id="38" creationId="{88E46573-3AC0-4E5D-A904-8823DC14FB2F}"/>
-          </ac:spMkLst>
-        </pc:spChg>
-        <pc:spChg chg="add mod">
-          <ac:chgData name="Edmund Crawley" userId="5604ff08deb8de49" providerId="LiveId" clId="{AD5C14C3-8D77-4BFF-AAAD-F45DD473A74C}" dt="2018-09-10T21:42:12.317" v="369" actId="1076"/>
-          <ac:spMkLst>
-            <pc:docMk/>
-            <pc:sldMk cId="3824343056" sldId="258"/>
-            <ac:spMk id="39" creationId="{B099CD58-C511-4480-AB0F-EF8208008600}"/>
-          </ac:spMkLst>
-        </pc:spChg>
-        <pc:spChg chg="add mod">
-          <ac:chgData name="Edmund Crawley" userId="5604ff08deb8de49" providerId="LiveId" clId="{AD5C14C3-8D77-4BFF-AAAD-F45DD473A74C}" dt="2018-09-10T21:42:12.317" v="369" actId="1076"/>
-          <ac:spMkLst>
-            <pc:docMk/>
-            <pc:sldMk cId="3824343056" sldId="258"/>
-            <ac:spMk id="40" creationId="{DBF12129-17DD-4C79-8000-F7DB6837CC01}"/>
-          </ac:spMkLst>
-        </pc:spChg>
-        <pc:spChg chg="add mod">
-          <ac:chgData name="Edmund Crawley" userId="5604ff08deb8de49" providerId="LiveId" clId="{AD5C14C3-8D77-4BFF-AAAD-F45DD473A74C}" dt="2018-09-10T21:42:12.317" v="369" actId="1076"/>
-          <ac:spMkLst>
-            <pc:docMk/>
-            <pc:sldMk cId="3824343056" sldId="258"/>
-            <ac:spMk id="41" creationId="{F30B985A-786A-49D4-9703-9219594FBF29}"/>
-          </ac:spMkLst>
-        </pc:spChg>
-        <pc:spChg chg="add mod">
-          <ac:chgData name="Edmund Crawley" userId="5604ff08deb8de49" providerId="LiveId" clId="{AD5C14C3-8D77-4BFF-AAAD-F45DD473A74C}" dt="2018-09-10T21:42:12.317" v="369" actId="1076"/>
-          <ac:spMkLst>
-            <pc:docMk/>
-            <pc:sldMk cId="3824343056" sldId="258"/>
-            <ac:spMk id="42" creationId="{B89324CD-4707-425F-8363-1676FD8E6918}"/>
-          </ac:spMkLst>
-        </pc:spChg>
-        <pc:spChg chg="add mod">
-          <ac:chgData name="Edmund Crawley" userId="5604ff08deb8de49" providerId="LiveId" clId="{AD5C14C3-8D77-4BFF-AAAD-F45DD473A74C}" dt="2018-09-10T22:12:17.513" v="514" actId="114"/>
-          <ac:spMkLst>
-            <pc:docMk/>
-            <pc:sldMk cId="3824343056" sldId="258"/>
-            <ac:spMk id="43" creationId="{C3559FD1-3806-4A8A-934C-967ADA2EBC5A}"/>
-          </ac:spMkLst>
-        </pc:spChg>
-        <pc:spChg chg="add mod">
-          <ac:chgData name="Edmund Crawley" userId="5604ff08deb8de49" providerId="LiveId" clId="{AD5C14C3-8D77-4BFF-AAAD-F45DD473A74C}" dt="2018-09-10T22:12:35.208" v="516" actId="114"/>
-          <ac:spMkLst>
-            <pc:docMk/>
-            <pc:sldMk cId="3824343056" sldId="258"/>
-            <ac:spMk id="44" creationId="{2B7049AA-0B30-4A23-A037-16B59604A68C}"/>
-          </ac:spMkLst>
-        </pc:spChg>
-        <pc:picChg chg="add mod">
-          <ac:chgData name="Edmund Crawley" userId="5604ff08deb8de49" providerId="LiveId" clId="{AD5C14C3-8D77-4BFF-AAAD-F45DD473A74C}" dt="2018-09-10T18:11:21.300" v="131" actId="1076"/>
-          <ac:picMkLst>
-            <pc:docMk/>
-            <pc:sldMk cId="3824343056" sldId="258"/>
-            <ac:picMk id="8" creationId="{839C2947-445F-4D50-9240-4AAEAA6710BD}"/>
-          </ac:picMkLst>
-        </pc:picChg>
-        <pc:picChg chg="add mod">
-          <ac:chgData name="Edmund Crawley" userId="5604ff08deb8de49" providerId="LiveId" clId="{AD5C14C3-8D77-4BFF-AAAD-F45DD473A74C}" dt="2018-09-10T18:09:44.413" v="104" actId="1076"/>
-          <ac:picMkLst>
-            <pc:docMk/>
-            <pc:sldMk cId="3824343056" sldId="258"/>
-            <ac:picMk id="9" creationId="{7728CAC3-056E-4BB0-B74F-09545DE8A95E}"/>
-          </ac:picMkLst>
-        </pc:picChg>
-        <pc:picChg chg="add mod">
-          <ac:chgData name="Edmund Crawley" userId="5604ff08deb8de49" providerId="LiveId" clId="{AD5C14C3-8D77-4BFF-AAAD-F45DD473A74C}" dt="2018-09-10T18:10:05.817" v="108" actId="1076"/>
-          <ac:picMkLst>
-            <pc:docMk/>
-            <pc:sldMk cId="3824343056" sldId="258"/>
-            <ac:picMk id="17" creationId="{AE4711AC-A697-4FFD-AD53-74E8B4A0ACEB}"/>
-          </ac:picMkLst>
-        </pc:picChg>
-        <pc:picChg chg="add mod">
-          <ac:chgData name="Edmund Crawley" userId="5604ff08deb8de49" providerId="LiveId" clId="{AD5C14C3-8D77-4BFF-AAAD-F45DD473A74C}" dt="2018-09-10T18:43:50.951" v="167" actId="1076"/>
-          <ac:picMkLst>
-            <pc:docMk/>
-            <pc:sldMk cId="3824343056" sldId="258"/>
-            <ac:picMk id="28" creationId="{A34A28B9-BE59-4C4B-B9F2-4C01BFA11BC9}"/>
-          </ac:picMkLst>
-        </pc:picChg>
-      </pc:sldChg>
-    </pc:docChg>
-  </pc:docChgLst>
-  <pc:docChgLst>
-    <pc:chgData name="Edmund Crawley" userId="5604ff08deb8de49" providerId="LiveId" clId="{501EA124-0FCB-41A0-8E0F-DE8006257D16}"/>
-    <pc:docChg chg="undo custSel addSld modSld">
-      <pc:chgData name="Edmund Crawley" userId="5604ff08deb8de49" providerId="LiveId" clId="{501EA124-0FCB-41A0-8E0F-DE8006257D16}" dt="2018-09-07T20:49:47.914" v="756" actId="2085"/>
-      <pc:docMkLst>
-        <pc:docMk/>
-      </pc:docMkLst>
-      <pc:sldChg chg="addSp delSp modSp modAnim">
-        <pc:chgData name="Edmund Crawley" userId="5604ff08deb8de49" providerId="LiveId" clId="{501EA124-0FCB-41A0-8E0F-DE8006257D16}" dt="2018-09-07T20:49:31.918" v="755" actId="2085"/>
-        <pc:sldMkLst>
-          <pc:docMk/>
-          <pc:sldMk cId="1727725578" sldId="256"/>
-        </pc:sldMkLst>
-        <pc:spChg chg="mod">
-          <ac:chgData name="Edmund Crawley" userId="5604ff08deb8de49" providerId="LiveId" clId="{501EA124-0FCB-41A0-8E0F-DE8006257D16}" dt="2018-09-07T19:47:48.869" v="1" actId="14100"/>
-          <ac:spMkLst>
-            <pc:docMk/>
-            <pc:sldMk cId="1727725578" sldId="256"/>
-            <ac:spMk id="4" creationId="{2EA75DF5-F45E-4F5E-951F-E8A485A82303}"/>
-          </ac:spMkLst>
-        </pc:spChg>
-        <pc:spChg chg="mod">
-          <ac:chgData name="Edmund Crawley" userId="5604ff08deb8de49" providerId="LiveId" clId="{501EA124-0FCB-41A0-8E0F-DE8006257D16}" dt="2018-09-07T19:53:11.183" v="54" actId="1038"/>
-          <ac:spMkLst>
-            <pc:docMk/>
-            <pc:sldMk cId="1727725578" sldId="256"/>
-            <ac:spMk id="5" creationId="{4C0606CE-E232-4145-A26C-8DCF2D8AFB44}"/>
-          </ac:spMkLst>
-        </pc:spChg>
-        <pc:spChg chg="mod">
-          <ac:chgData name="Edmund Crawley" userId="5604ff08deb8de49" providerId="LiveId" clId="{501EA124-0FCB-41A0-8E0F-DE8006257D16}" dt="2018-09-07T20:21:15.519" v="480" actId="1035"/>
-          <ac:spMkLst>
-            <pc:docMk/>
-            <pc:sldMk cId="1727725578" sldId="256"/>
-            <ac:spMk id="6" creationId="{BC3622EF-7936-4187-A7E8-951EA80F8FF5}"/>
-          </ac:spMkLst>
-        </pc:spChg>
-        <pc:spChg chg="del mod">
-          <ac:chgData name="Edmund Crawley" userId="5604ff08deb8de49" providerId="LiveId" clId="{501EA124-0FCB-41A0-8E0F-DE8006257D16}" dt="2018-09-07T19:53:05.622" v="26" actId="478"/>
-          <ac:spMkLst>
-            <pc:docMk/>
-            <pc:sldMk cId="1727725578" sldId="256"/>
-            <ac:spMk id="7" creationId="{5A14E766-18B7-409E-A34A-716911122078}"/>
-          </ac:spMkLst>
-        </pc:spChg>
-        <pc:spChg chg="mod">
-          <ac:chgData name="Edmund Crawley" userId="5604ff08deb8de49" providerId="LiveId" clId="{501EA124-0FCB-41A0-8E0F-DE8006257D16}" dt="2018-09-07T20:21:09.561" v="471" actId="1035"/>
-          <ac:spMkLst>
-            <pc:docMk/>
-            <pc:sldMk cId="1727725578" sldId="256"/>
-            <ac:spMk id="8" creationId="{9DA7DDDB-FE7A-4460-93A7-085DE747BEB8}"/>
-          </ac:spMkLst>
-        </pc:spChg>
-        <pc:spChg chg="add mod">
-          <ac:chgData name="Edmund Crawley" userId="5604ff08deb8de49" providerId="LiveId" clId="{501EA124-0FCB-41A0-8E0F-DE8006257D16}" dt="2018-09-07T19:54:11.741" v="74" actId="14100"/>
-          <ac:spMkLst>
-            <pc:docMk/>
-            <pc:sldMk cId="1727725578" sldId="256"/>
-            <ac:spMk id="12" creationId="{36D92E69-C78C-47F6-B927-211B6BA4C6B9}"/>
-          </ac:spMkLst>
-        </pc:spChg>
-        <pc:spChg chg="add mod">
-          <ac:chgData name="Edmund Crawley" userId="5604ff08deb8de49" providerId="LiveId" clId="{501EA124-0FCB-41A0-8E0F-DE8006257D16}" dt="2018-09-07T20:43:48.357" v="680" actId="20577"/>
-          <ac:spMkLst>
-            <pc:docMk/>
-            <pc:sldMk cId="1727725578" sldId="256"/>
-            <ac:spMk id="13" creationId="{DD498059-A5E0-48AE-9B39-F12E09F2F515}"/>
-          </ac:spMkLst>
-        </pc:spChg>
-        <pc:spChg chg="add mod">
-          <ac:chgData name="Edmund Crawley" userId="5604ff08deb8de49" providerId="LiveId" clId="{501EA124-0FCB-41A0-8E0F-DE8006257D16}" dt="2018-09-07T19:56:01.154" v="117" actId="1037"/>
-          <ac:spMkLst>
-            <pc:docMk/>
-            <pc:sldMk cId="1727725578" sldId="256"/>
-            <ac:spMk id="14" creationId="{80102CB1-AB2E-4F26-A7F6-711F23074FBE}"/>
-          </ac:spMkLst>
-        </pc:spChg>
-        <pc:spChg chg="add mod">
-          <ac:chgData name="Edmund Crawley" userId="5604ff08deb8de49" providerId="LiveId" clId="{501EA124-0FCB-41A0-8E0F-DE8006257D16}" dt="2018-09-07T19:56:53.498" v="329" actId="20577"/>
-          <ac:spMkLst>
-            <pc:docMk/>
-            <pc:sldMk cId="1727725578" sldId="256"/>
-            <ac:spMk id="16" creationId="{A0381498-793F-4AB0-B245-418EDFEF217F}"/>
-          </ac:spMkLst>
-        </pc:spChg>
-        <pc:spChg chg="add mod">
-          <ac:chgData name="Edmund Crawley" userId="5604ff08deb8de49" providerId="LiveId" clId="{501EA124-0FCB-41A0-8E0F-DE8006257D16}" dt="2018-09-07T20:17:53.438" v="384" actId="1076"/>
-          <ac:spMkLst>
-            <pc:docMk/>
-            <pc:sldMk cId="1727725578" sldId="256"/>
-            <ac:spMk id="17" creationId="{DCFC2F17-DDD8-4064-A037-1D28CBB140FE}"/>
-          </ac:spMkLst>
-        </pc:spChg>
-        <pc:spChg chg="add mod">
-          <ac:chgData name="Edmund Crawley" userId="5604ff08deb8de49" providerId="LiveId" clId="{501EA124-0FCB-41A0-8E0F-DE8006257D16}" dt="2018-09-07T20:21:02.032" v="462" actId="1035"/>
-          <ac:spMkLst>
-            <pc:docMk/>
-            <pc:sldMk cId="1727725578" sldId="256"/>
-            <ac:spMk id="18" creationId="{AD47A348-5C4B-4BF8-B34F-72726B80642F}"/>
-          </ac:spMkLst>
-        </pc:spChg>
-        <pc:spChg chg="add mod">
-          <ac:chgData name="Edmund Crawley" userId="5604ff08deb8de49" providerId="LiveId" clId="{501EA124-0FCB-41A0-8E0F-DE8006257D16}" dt="2018-09-07T20:33:42.282" v="492" actId="20577"/>
-          <ac:spMkLst>
-            <pc:docMk/>
-            <pc:sldMk cId="1727725578" sldId="256"/>
-            <ac:spMk id="20" creationId="{FAB360F1-E750-490F-8688-CE52EA300EA5}"/>
-          </ac:spMkLst>
-        </pc:spChg>
-        <pc:spChg chg="add mod">
-          <ac:chgData name="Edmund Crawley" userId="5604ff08deb8de49" providerId="LiveId" clId="{501EA124-0FCB-41A0-8E0F-DE8006257D16}" dt="2018-09-07T20:49:15.884" v="753" actId="2085"/>
-          <ac:spMkLst>
-            <pc:docMk/>
-            <pc:sldMk cId="1727725578" sldId="256"/>
-            <ac:spMk id="22" creationId="{44744D90-1621-4F69-AF33-7EEF3183B07E}"/>
-          </ac:spMkLst>
-        </pc:spChg>
-        <pc:spChg chg="add mod">
-          <ac:chgData name="Edmund Crawley" userId="5604ff08deb8de49" providerId="LiveId" clId="{501EA124-0FCB-41A0-8E0F-DE8006257D16}" dt="2018-09-07T20:49:25.468" v="754" actId="2085"/>
-          <ac:spMkLst>
-            <pc:docMk/>
-            <pc:sldMk cId="1727725578" sldId="256"/>
-            <ac:spMk id="23" creationId="{695FC641-CED5-4FA6-B5FA-A3A1379FF669}"/>
-          </ac:spMkLst>
-        </pc:spChg>
-        <pc:spChg chg="add mod">
-          <ac:chgData name="Edmund Crawley" userId="5604ff08deb8de49" providerId="LiveId" clId="{501EA124-0FCB-41A0-8E0F-DE8006257D16}" dt="2018-09-07T20:49:31.918" v="755" actId="2085"/>
-          <ac:spMkLst>
-            <pc:docMk/>
-            <pc:sldMk cId="1727725578" sldId="256"/>
-            <ac:spMk id="24" creationId="{EF0559F2-BC05-46F0-BB31-9D77E689C7DD}"/>
-          </ac:spMkLst>
-        </pc:spChg>
-        <pc:picChg chg="mod">
-          <ac:chgData name="Edmund Crawley" userId="5604ff08deb8de49" providerId="LiveId" clId="{501EA124-0FCB-41A0-8E0F-DE8006257D16}" dt="2018-09-07T19:53:11.183" v="54" actId="1038"/>
-          <ac:picMkLst>
-            <pc:docMk/>
-            <pc:sldMk cId="1727725578" sldId="256"/>
-            <ac:picMk id="10" creationId="{2A0039EA-2E35-4912-A4E6-044D9C981C02}"/>
-          </ac:picMkLst>
-        </pc:picChg>
-        <pc:picChg chg="mod">
-          <ac:chgData name="Edmund Crawley" userId="5604ff08deb8de49" providerId="LiveId" clId="{501EA124-0FCB-41A0-8E0F-DE8006257D16}" dt="2018-09-07T19:47:48.869" v="1" actId="14100"/>
-          <ac:picMkLst>
-            <pc:docMk/>
-            <pc:sldMk cId="1727725578" sldId="256"/>
-            <ac:picMk id="11" creationId="{CCDFE070-9E49-4408-B7E5-F3D9887C1FB3}"/>
-          </ac:picMkLst>
-        </pc:picChg>
-        <pc:picChg chg="add del">
-          <ac:chgData name="Edmund Crawley" userId="5604ff08deb8de49" providerId="LiveId" clId="{501EA124-0FCB-41A0-8E0F-DE8006257D16}" dt="2018-09-07T19:56:13.291" v="119"/>
-          <ac:picMkLst>
-            <pc:docMk/>
-            <pc:sldMk cId="1727725578" sldId="256"/>
-            <ac:picMk id="15" creationId="{44C2CAC8-4ED8-4BFB-A7B7-550DB3B6D7B1}"/>
-          </ac:picMkLst>
-        </pc:picChg>
-        <pc:picChg chg="add del mod">
-          <ac:chgData name="Edmund Crawley" userId="5604ff08deb8de49" providerId="LiveId" clId="{501EA124-0FCB-41A0-8E0F-DE8006257D16}" dt="2018-09-07T20:19:36.079" v="446" actId="478"/>
-          <ac:picMkLst>
-            <pc:docMk/>
-            <pc:sldMk cId="1727725578" sldId="256"/>
-            <ac:picMk id="19" creationId="{453FFADA-81A1-466A-AF8C-CF069C87D9EE}"/>
-          </ac:picMkLst>
-        </pc:picChg>
-        <pc:picChg chg="add mod">
-          <ac:chgData name="Edmund Crawley" userId="5604ff08deb8de49" providerId="LiveId" clId="{501EA124-0FCB-41A0-8E0F-DE8006257D16}" dt="2018-09-07T20:20:32.866" v="451" actId="207"/>
-          <ac:picMkLst>
-            <pc:docMk/>
-            <pc:sldMk cId="1727725578" sldId="256"/>
-            <ac:picMk id="21" creationId="{30B2620B-9898-4CF2-B795-F2842A06D439}"/>
-          </ac:picMkLst>
-        </pc:picChg>
-      </pc:sldChg>
-      <pc:sldChg chg="addSp delSp modSp add modAnim">
-        <pc:chgData name="Edmund Crawley" userId="5604ff08deb8de49" providerId="LiveId" clId="{501EA124-0FCB-41A0-8E0F-DE8006257D16}" dt="2018-09-07T20:49:47.914" v="756" actId="2085"/>
-        <pc:sldMkLst>
-          <pc:docMk/>
-          <pc:sldMk cId="3987087717" sldId="257"/>
-        </pc:sldMkLst>
-        <pc:spChg chg="del">
-          <ac:chgData name="Edmund Crawley" userId="5604ff08deb8de49" providerId="LiveId" clId="{501EA124-0FCB-41A0-8E0F-DE8006257D16}" dt="2018-09-07T20:45:46.633" v="683" actId="478"/>
-          <ac:spMkLst>
-            <pc:docMk/>
-            <pc:sldMk cId="3987087717" sldId="257"/>
-            <ac:spMk id="2" creationId="{5A16EC81-5DDC-4FCE-9826-D0B5A4149196}"/>
-          </ac:spMkLst>
-        </pc:spChg>
-        <pc:spChg chg="del">
-          <ac:chgData name="Edmund Crawley" userId="5604ff08deb8de49" providerId="LiveId" clId="{501EA124-0FCB-41A0-8E0F-DE8006257D16}" dt="2018-09-07T20:45:49.205" v="684" actId="478"/>
-          <ac:spMkLst>
-            <pc:docMk/>
-            <pc:sldMk cId="3987087717" sldId="257"/>
-            <ac:spMk id="3" creationId="{38761164-A553-47E7-B218-DB129E74F479}"/>
-          </ac:spMkLst>
-        </pc:spChg>
-        <pc:spChg chg="add mod">
-          <ac:chgData name="Edmund Crawley" userId="5604ff08deb8de49" providerId="LiveId" clId="{501EA124-0FCB-41A0-8E0F-DE8006257D16}" dt="2018-09-07T20:49:47.914" v="756" actId="2085"/>
-          <ac:spMkLst>
-            <pc:docMk/>
-            <pc:sldMk cId="3987087717" sldId="257"/>
-            <ac:spMk id="4" creationId="{4AD924A9-A68E-4D29-9D85-887D7DB24F9E}"/>
-          </ac:spMkLst>
-        </pc:spChg>
-        <pc:spChg chg="add mod">
-          <ac:chgData name="Edmund Crawley" userId="5604ff08deb8de49" providerId="LiveId" clId="{501EA124-0FCB-41A0-8E0F-DE8006257D16}" dt="2018-09-07T20:49:47.914" v="756" actId="2085"/>
-          <ac:spMkLst>
-            <pc:docMk/>
-            <pc:sldMk cId="3987087717" sldId="257"/>
-            <ac:spMk id="5" creationId="{EA64F0B7-A3EC-4355-A11F-DA2323BFECC2}"/>
-          </ac:spMkLst>
-        </pc:spChg>
-        <pc:spChg chg="add mod">
-          <ac:chgData name="Edmund Crawley" userId="5604ff08deb8de49" providerId="LiveId" clId="{501EA124-0FCB-41A0-8E0F-DE8006257D16}" dt="2018-09-07T20:49:47.914" v="756" actId="2085"/>
-          <ac:spMkLst>
-            <pc:docMk/>
-            <pc:sldMk cId="3987087717" sldId="257"/>
-            <ac:spMk id="6" creationId="{72E0CB1B-3B81-4279-98C5-AD382AF20EC2}"/>
-          </ac:spMkLst>
-        </pc:spChg>
-        <pc:spChg chg="add mod">
-          <ac:chgData name="Edmund Crawley" userId="5604ff08deb8de49" providerId="LiveId" clId="{501EA124-0FCB-41A0-8E0F-DE8006257D16}" dt="2018-09-07T20:49:47.914" v="756" actId="2085"/>
-          <ac:spMkLst>
-            <pc:docMk/>
-            <pc:sldMk cId="3987087717" sldId="257"/>
-            <ac:spMk id="7" creationId="{78321BE4-6EFC-4EE8-9947-C8CF485C4A42}"/>
-          </ac:spMkLst>
-        </pc:spChg>
-        <pc:spChg chg="add mod">
-          <ac:chgData name="Edmund Crawley" userId="5604ff08deb8de49" providerId="LiveId" clId="{501EA124-0FCB-41A0-8E0F-DE8006257D16}" dt="2018-09-07T20:49:47.914" v="756" actId="2085"/>
-          <ac:spMkLst>
-            <pc:docMk/>
-            <pc:sldMk cId="3987087717" sldId="257"/>
-            <ac:spMk id="8" creationId="{03308438-9B1F-45BD-9248-55F66CA6D35D}"/>
-          </ac:spMkLst>
-        </pc:spChg>
-        <pc:spChg chg="add mod">
-          <ac:chgData name="Edmund Crawley" userId="5604ff08deb8de49" providerId="LiveId" clId="{501EA124-0FCB-41A0-8E0F-DE8006257D16}" dt="2018-09-07T20:49:47.914" v="756" actId="2085"/>
-          <ac:spMkLst>
-            <pc:docMk/>
-            <pc:sldMk cId="3987087717" sldId="257"/>
-            <ac:spMk id="9" creationId="{B880C40C-012F-4341-8591-2B96F9F34F9F}"/>
-          </ac:spMkLst>
-        </pc:spChg>
-        <pc:spChg chg="add mod">
-          <ac:chgData name="Edmund Crawley" userId="5604ff08deb8de49" providerId="LiveId" clId="{501EA124-0FCB-41A0-8E0F-DE8006257D16}" dt="2018-09-07T20:49:47.914" v="756" actId="2085"/>
-          <ac:spMkLst>
-            <pc:docMk/>
-            <pc:sldMk cId="3987087717" sldId="257"/>
-            <ac:spMk id="10" creationId="{DE31DF2F-134C-4A50-9B71-72FD3B365A07}"/>
-          </ac:spMkLst>
-        </pc:spChg>
-      </pc:sldChg>
-    </pc:docChg>
-  </pc:docChgLst>
-</pc:chgInfo>
-</file>
-
 <file path=ppt/slideLayouts/slideLayout1.xml><?xml version="1.0" encoding="utf-8"?>
 <p:sldLayout xmlns:a="http://schemas.openxmlformats.org/drawingml/2006/main" xmlns:r="http://schemas.openxmlformats.org/officeDocument/2006/relationships" xmlns:p="http://schemas.openxmlformats.org/presentationml/2006/main" type="title" preserve="1">
   <p:cSld name="Title Slide">
@@ -968,7 +261,7 @@
           <a:p>
             <a:fld id="{23D77BCE-F76E-4A53-B457-B198FEE3CCBD}" type="datetimeFigureOut">
               <a:rPr lang="en-US" smtClean="0"/>
-              <a:t>9/7/2018</a:t>
+              <a:t>9/12/2018</a:t>
             </a:fld>
             <a:endParaRPr lang="en-US"/>
           </a:p>
@@ -1166,7 +459,7 @@
           <a:p>
             <a:fld id="{23D77BCE-F76E-4A53-B457-B198FEE3CCBD}" type="datetimeFigureOut">
               <a:rPr lang="en-US" smtClean="0"/>
-              <a:t>9/7/2018</a:t>
+              <a:t>9/12/2018</a:t>
             </a:fld>
             <a:endParaRPr lang="en-US"/>
           </a:p>
@@ -1374,7 +667,7 @@
           <a:p>
             <a:fld id="{23D77BCE-F76E-4A53-B457-B198FEE3CCBD}" type="datetimeFigureOut">
               <a:rPr lang="en-US" smtClean="0"/>
-              <a:t>9/7/2018</a:t>
+              <a:t>9/12/2018</a:t>
             </a:fld>
             <a:endParaRPr lang="en-US"/>
           </a:p>
@@ -1572,7 +865,7 @@
           <a:p>
             <a:fld id="{23D77BCE-F76E-4A53-B457-B198FEE3CCBD}" type="datetimeFigureOut">
               <a:rPr lang="en-US" smtClean="0"/>
-              <a:t>9/7/2018</a:t>
+              <a:t>9/12/2018</a:t>
             </a:fld>
             <a:endParaRPr lang="en-US"/>
           </a:p>
@@ -1847,7 +1140,7 @@
           <a:p>
             <a:fld id="{23D77BCE-F76E-4A53-B457-B198FEE3CCBD}" type="datetimeFigureOut">
               <a:rPr lang="en-US" smtClean="0"/>
-              <a:t>9/7/2018</a:t>
+              <a:t>9/12/2018</a:t>
             </a:fld>
             <a:endParaRPr lang="en-US"/>
           </a:p>
@@ -2112,7 +1405,7 @@
           <a:p>
             <a:fld id="{23D77BCE-F76E-4A53-B457-B198FEE3CCBD}" type="datetimeFigureOut">
               <a:rPr lang="en-US" smtClean="0"/>
-              <a:t>9/7/2018</a:t>
+              <a:t>9/12/2018</a:t>
             </a:fld>
             <a:endParaRPr lang="en-US"/>
           </a:p>
@@ -2524,7 +1817,7 @@
           <a:p>
             <a:fld id="{23D77BCE-F76E-4A53-B457-B198FEE3CCBD}" type="datetimeFigureOut">
               <a:rPr lang="en-US" smtClean="0"/>
-              <a:t>9/7/2018</a:t>
+              <a:t>9/12/2018</a:t>
             </a:fld>
             <a:endParaRPr lang="en-US"/>
           </a:p>
@@ -2665,7 +1958,7 @@
           <a:p>
             <a:fld id="{23D77BCE-F76E-4A53-B457-B198FEE3CCBD}" type="datetimeFigureOut">
               <a:rPr lang="en-US" smtClean="0"/>
-              <a:t>9/7/2018</a:t>
+              <a:t>9/12/2018</a:t>
             </a:fld>
             <a:endParaRPr lang="en-US"/>
           </a:p>
@@ -2778,7 +2071,7 @@
           <a:p>
             <a:fld id="{23D77BCE-F76E-4A53-B457-B198FEE3CCBD}" type="datetimeFigureOut">
               <a:rPr lang="en-US" smtClean="0"/>
-              <a:t>9/7/2018</a:t>
+              <a:t>9/12/2018</a:t>
             </a:fld>
             <a:endParaRPr lang="en-US"/>
           </a:p>
@@ -3089,7 +2382,7 @@
           <a:p>
             <a:fld id="{23D77BCE-F76E-4A53-B457-B198FEE3CCBD}" type="datetimeFigureOut">
               <a:rPr lang="en-US" smtClean="0"/>
-              <a:t>9/7/2018</a:t>
+              <a:t>9/12/2018</a:t>
             </a:fld>
             <a:endParaRPr lang="en-US"/>
           </a:p>
@@ -3377,7 +2670,7 @@
           <a:p>
             <a:fld id="{23D77BCE-F76E-4A53-B457-B198FEE3CCBD}" type="datetimeFigureOut">
               <a:rPr lang="en-US" smtClean="0"/>
-              <a:t>9/7/2018</a:t>
+              <a:t>9/12/2018</a:t>
             </a:fld>
             <a:endParaRPr lang="en-US"/>
           </a:p>
@@ -3618,7 +2911,7 @@
           <a:p>
             <a:fld id="{23D77BCE-F76E-4A53-B457-B198FEE3CCBD}" type="datetimeFigureOut">
               <a:rPr lang="en-US" smtClean="0"/>
-              <a:t>9/7/2018</a:t>
+              <a:t>9/12/2018</a:t>
             </a:fld>
             <a:endParaRPr lang="en-US"/>
           </a:p>
@@ -6855,114 +6148,10 @@
       </p:sp>
       <p:sp>
         <p:nvSpPr>
-          <p:cNvPr id="36" name="Arrow: Down 35">
-            <a:extLst>
-              <a:ext uri="{FF2B5EF4-FFF2-40B4-BE49-F238E27FC236}">
-                <a16:creationId xmlns:a16="http://schemas.microsoft.com/office/drawing/2014/main" id="{51E978A5-2540-493E-B090-C8C9C3DEF3B3}"/>
-              </a:ext>
-            </a:extLst>
-          </p:cNvPr>
-          <p:cNvSpPr/>
-          <p:nvPr/>
-        </p:nvSpPr>
-        <p:spPr>
-          <a:xfrm>
-            <a:off x="1047831" y="5335221"/>
-            <a:ext cx="323628" cy="947626"/>
-          </a:xfrm>
-          <a:prstGeom prst="downArrow">
-            <a:avLst/>
-          </a:prstGeom>
-          <a:solidFill>
-            <a:srgbClr val="FF0000"/>
-          </a:solidFill>
-          <a:ln>
-            <a:noFill/>
-          </a:ln>
-        </p:spPr>
-        <p:style>
-          <a:lnRef idx="2">
-            <a:schemeClr val="accent1">
-              <a:shade val="50000"/>
-            </a:schemeClr>
-          </a:lnRef>
-          <a:fillRef idx="1">
-            <a:schemeClr val="accent1"/>
-          </a:fillRef>
-          <a:effectRef idx="0">
-            <a:schemeClr val="accent1"/>
-          </a:effectRef>
-          <a:fontRef idx="minor">
-            <a:schemeClr val="lt1"/>
-          </a:fontRef>
-        </p:style>
-        <p:txBody>
-          <a:bodyPr rtlCol="0" anchor="ctr"/>
-          <a:lstStyle/>
-          <a:p>
-            <a:pPr algn="ctr"/>
-            <a:endParaRPr lang="en-US"/>
-          </a:p>
-        </p:txBody>
-      </p:sp>
-      <p:sp>
-        <p:nvSpPr>
-          <p:cNvPr id="37" name="Arrow: Up-Down 36">
-            <a:extLst>
-              <a:ext uri="{FF2B5EF4-FFF2-40B4-BE49-F238E27FC236}">
-                <a16:creationId xmlns:a16="http://schemas.microsoft.com/office/drawing/2014/main" id="{023F5BAE-119B-406F-8ACA-3651433283B8}"/>
-              </a:ext>
-            </a:extLst>
-          </p:cNvPr>
-          <p:cNvSpPr/>
-          <p:nvPr/>
-        </p:nvSpPr>
-        <p:spPr>
-          <a:xfrm>
-            <a:off x="1641852" y="5228367"/>
-            <a:ext cx="257613" cy="213708"/>
-          </a:xfrm>
-          <a:prstGeom prst="upDownArrow">
-            <a:avLst/>
-          </a:prstGeom>
-          <a:solidFill>
-            <a:srgbClr val="FF0000"/>
-          </a:solidFill>
-          <a:ln>
-            <a:noFill/>
-          </a:ln>
-        </p:spPr>
-        <p:style>
-          <a:lnRef idx="2">
-            <a:schemeClr val="accent1">
-              <a:shade val="50000"/>
-            </a:schemeClr>
-          </a:lnRef>
-          <a:fillRef idx="1">
-            <a:schemeClr val="accent1"/>
-          </a:fillRef>
-          <a:effectRef idx="0">
-            <a:schemeClr val="accent1"/>
-          </a:effectRef>
-          <a:fontRef idx="minor">
-            <a:schemeClr val="lt1"/>
-          </a:fontRef>
-        </p:style>
-        <p:txBody>
-          <a:bodyPr rtlCol="0" anchor="ctr"/>
-          <a:lstStyle/>
-          <a:p>
-            <a:pPr algn="ctr"/>
-            <a:endParaRPr lang="en-US"/>
-          </a:p>
-        </p:txBody>
-      </p:sp>
-      <p:sp>
-        <p:nvSpPr>
-          <p:cNvPr id="38" name="TextBox 37">
-            <a:extLst>
-              <a:ext uri="{FF2B5EF4-FFF2-40B4-BE49-F238E27FC236}">
-                <a16:creationId xmlns:a16="http://schemas.microsoft.com/office/drawing/2014/main" id="{88E46573-3AC0-4E5D-A904-8823DC14FB2F}"/>
+          <p:cNvPr id="43" name="TextBox 42">
+            <a:extLst>
+              <a:ext uri="{FF2B5EF4-FFF2-40B4-BE49-F238E27FC236}">
+                <a16:creationId xmlns:a16="http://schemas.microsoft.com/office/drawing/2014/main" id="{C3559FD1-3806-4A8A-934C-967ADA2EBC5A}"/>
               </a:ext>
             </a:extLst>
           </p:cNvPr>
@@ -6971,16 +6160,13 @@
         </p:nvSpPr>
         <p:spPr>
           <a:xfrm>
-            <a:off x="1333253" y="5150555"/>
-            <a:ext cx="152395" cy="369332"/>
+            <a:off x="1250066" y="4760240"/>
+            <a:ext cx="9005104" cy="1446550"/>
           </a:xfrm>
           <a:prstGeom prst="rect">
             <a:avLst/>
           </a:prstGeom>
           <a:noFill/>
-          <a:ln>
-            <a:noFill/>
-          </a:ln>
         </p:spPr>
         <p:txBody>
           <a:bodyPr wrap="square" rtlCol="0">
@@ -6989,221 +6175,6 @@
           <a:lstStyle/>
           <a:p>
             <a:r>
-              <a:rPr lang="en-US" dirty="0"/>
-              <a:t>+</a:t>
-            </a:r>
-          </a:p>
-        </p:txBody>
-      </p:sp>
-      <p:sp>
-        <p:nvSpPr>
-          <p:cNvPr id="39" name="TextBox 38">
-            <a:extLst>
-              <a:ext uri="{FF2B5EF4-FFF2-40B4-BE49-F238E27FC236}">
-                <a16:creationId xmlns:a16="http://schemas.microsoft.com/office/drawing/2014/main" id="{B099CD58-C511-4480-AB0F-EF8208008600}"/>
-              </a:ext>
-            </a:extLst>
-          </p:cNvPr>
-          <p:cNvSpPr txBox="1"/>
-          <p:nvPr/>
-        </p:nvSpPr>
-        <p:spPr>
-          <a:xfrm>
-            <a:off x="1899465" y="5150555"/>
-            <a:ext cx="152395" cy="369332"/>
-          </a:xfrm>
-          <a:prstGeom prst="rect">
-            <a:avLst/>
-          </a:prstGeom>
-          <a:noFill/>
-          <a:ln>
-            <a:noFill/>
-          </a:ln>
-        </p:spPr>
-        <p:txBody>
-          <a:bodyPr wrap="square" rtlCol="0">
-            <a:spAutoFit/>
-          </a:bodyPr>
-          <a:lstStyle/>
-          <a:p>
-            <a:r>
-              <a:rPr lang="en-US" dirty="0"/>
-              <a:t>+</a:t>
-            </a:r>
-          </a:p>
-        </p:txBody>
-      </p:sp>
-      <p:sp>
-        <p:nvSpPr>
-          <p:cNvPr id="40" name="Arrow: Down 39">
-            <a:extLst>
-              <a:ext uri="{FF2B5EF4-FFF2-40B4-BE49-F238E27FC236}">
-                <a16:creationId xmlns:a16="http://schemas.microsoft.com/office/drawing/2014/main" id="{DBF12129-17DD-4C79-8000-F7DB6837CC01}"/>
-              </a:ext>
-            </a:extLst>
-          </p:cNvPr>
-          <p:cNvSpPr/>
-          <p:nvPr/>
-        </p:nvSpPr>
-        <p:spPr>
-          <a:xfrm flipV="1">
-            <a:off x="2100156" y="4958747"/>
-            <a:ext cx="323628" cy="376474"/>
-          </a:xfrm>
-          <a:prstGeom prst="downArrow">
-            <a:avLst/>
-          </a:prstGeom>
-          <a:solidFill>
-            <a:srgbClr val="FF0000"/>
-          </a:solidFill>
-          <a:ln>
-            <a:noFill/>
-          </a:ln>
-        </p:spPr>
-        <p:style>
-          <a:lnRef idx="2">
-            <a:schemeClr val="accent1">
-              <a:shade val="50000"/>
-            </a:schemeClr>
-          </a:lnRef>
-          <a:fillRef idx="1">
-            <a:schemeClr val="accent1"/>
-          </a:fillRef>
-          <a:effectRef idx="0">
-            <a:schemeClr val="accent1"/>
-          </a:effectRef>
-          <a:fontRef idx="minor">
-            <a:schemeClr val="lt1"/>
-          </a:fontRef>
-        </p:style>
-        <p:txBody>
-          <a:bodyPr rtlCol="0" anchor="ctr"/>
-          <a:lstStyle/>
-          <a:p>
-            <a:pPr algn="ctr"/>
-            <a:endParaRPr lang="en-US"/>
-          </a:p>
-        </p:txBody>
-      </p:sp>
-      <p:sp>
-        <p:nvSpPr>
-          <p:cNvPr id="41" name="Arrow: Down 40">
-            <a:extLst>
-              <a:ext uri="{FF2B5EF4-FFF2-40B4-BE49-F238E27FC236}">
-                <a16:creationId xmlns:a16="http://schemas.microsoft.com/office/drawing/2014/main" id="{F30B985A-786A-49D4-9703-9219594FBF29}"/>
-              </a:ext>
-            </a:extLst>
-          </p:cNvPr>
-          <p:cNvSpPr/>
-          <p:nvPr/>
-        </p:nvSpPr>
-        <p:spPr>
-          <a:xfrm>
-            <a:off x="2598464" y="5335221"/>
-            <a:ext cx="323628" cy="562141"/>
-          </a:xfrm>
-          <a:prstGeom prst="downArrow">
-            <a:avLst/>
-          </a:prstGeom>
-          <a:solidFill>
-            <a:srgbClr val="FF0000"/>
-          </a:solidFill>
-          <a:ln>
-            <a:noFill/>
-          </a:ln>
-        </p:spPr>
-        <p:style>
-          <a:lnRef idx="2">
-            <a:schemeClr val="accent1">
-              <a:shade val="50000"/>
-            </a:schemeClr>
-          </a:lnRef>
-          <a:fillRef idx="1">
-            <a:schemeClr val="accent1"/>
-          </a:fillRef>
-          <a:effectRef idx="0">
-            <a:schemeClr val="accent1"/>
-          </a:effectRef>
-          <a:fontRef idx="minor">
-            <a:schemeClr val="lt1"/>
-          </a:fontRef>
-        </p:style>
-        <p:txBody>
-          <a:bodyPr rtlCol="0" anchor="ctr"/>
-          <a:lstStyle/>
-          <a:p>
-            <a:pPr algn="ctr"/>
-            <a:endParaRPr lang="en-US"/>
-          </a:p>
-        </p:txBody>
-      </p:sp>
-      <p:sp>
-        <p:nvSpPr>
-          <p:cNvPr id="42" name="TextBox 41">
-            <a:extLst>
-              <a:ext uri="{FF2B5EF4-FFF2-40B4-BE49-F238E27FC236}">
-                <a16:creationId xmlns:a16="http://schemas.microsoft.com/office/drawing/2014/main" id="{B89324CD-4707-425F-8363-1676FD8E6918}"/>
-              </a:ext>
-            </a:extLst>
-          </p:cNvPr>
-          <p:cNvSpPr txBox="1"/>
-          <p:nvPr/>
-        </p:nvSpPr>
-        <p:spPr>
-          <a:xfrm>
-            <a:off x="2358728" y="5150555"/>
-            <a:ext cx="152395" cy="369332"/>
-          </a:xfrm>
-          <a:prstGeom prst="rect">
-            <a:avLst/>
-          </a:prstGeom>
-          <a:noFill/>
-          <a:ln>
-            <a:noFill/>
-          </a:ln>
-        </p:spPr>
-        <p:txBody>
-          <a:bodyPr wrap="square" rtlCol="0">
-            <a:spAutoFit/>
-          </a:bodyPr>
-          <a:lstStyle/>
-          <a:p>
-            <a:r>
-              <a:rPr lang="en-US" dirty="0"/>
-              <a:t>=</a:t>
-            </a:r>
-          </a:p>
-        </p:txBody>
-      </p:sp>
-      <p:sp>
-        <p:nvSpPr>
-          <p:cNvPr id="43" name="TextBox 42">
-            <a:extLst>
-              <a:ext uri="{FF2B5EF4-FFF2-40B4-BE49-F238E27FC236}">
-                <a16:creationId xmlns:a16="http://schemas.microsoft.com/office/drawing/2014/main" id="{C3559FD1-3806-4A8A-934C-967ADA2EBC5A}"/>
-              </a:ext>
-            </a:extLst>
-          </p:cNvPr>
-          <p:cNvSpPr txBox="1"/>
-          <p:nvPr/>
-        </p:nvSpPr>
-        <p:spPr>
-          <a:xfrm>
-            <a:off x="3385116" y="4636711"/>
-            <a:ext cx="6302467" cy="1107996"/>
-          </a:xfrm>
-          <a:prstGeom prst="rect">
-            <a:avLst/>
-          </a:prstGeom>
-          <a:noFill/>
-        </p:spPr>
-        <p:txBody>
-          <a:bodyPr wrap="square" rtlCol="0">
-            <a:spAutoFit/>
-          </a:bodyPr>
-          <a:lstStyle/>
-          <a:p>
-            <a:r>
               <a:rPr lang="en-US" sz="2200" dirty="0"/>
               <a:t>A </a:t>
             </a:r>
@@ -7232,35 +6203,9 @@
               <a:t>alone</a:t>
             </a:r>
           </a:p>
-        </p:txBody>
-      </p:sp>
-      <p:sp>
-        <p:nvSpPr>
-          <p:cNvPr id="44" name="TextBox 43">
-            <a:extLst>
-              <a:ext uri="{FF2B5EF4-FFF2-40B4-BE49-F238E27FC236}">
-                <a16:creationId xmlns:a16="http://schemas.microsoft.com/office/drawing/2014/main" id="{2B7049AA-0B30-4A23-A037-16B59604A68C}"/>
-              </a:ext>
-            </a:extLst>
-          </p:cNvPr>
-          <p:cNvSpPr txBox="1"/>
-          <p:nvPr/>
-        </p:nvSpPr>
-        <p:spPr>
-          <a:xfrm>
-            <a:off x="3406123" y="5851960"/>
-            <a:ext cx="6302467" cy="430887"/>
-          </a:xfrm>
-          <a:prstGeom prst="rect">
-            <a:avLst/>
-          </a:prstGeom>
-          <a:noFill/>
-        </p:spPr>
-        <p:txBody>
-          <a:bodyPr wrap="square" rtlCol="0">
-            <a:spAutoFit/>
-          </a:bodyPr>
-          <a:lstStyle/>
+          <a:p>
+            <a:endParaRPr lang="en-US" sz="2200" dirty="0"/>
+          </a:p>
           <a:p>
             <a:r>
               <a:rPr lang="en-US" sz="2200" b="1" dirty="0"/>
@@ -7632,318 +6577,21 @@
                                   </p:childTnLst>
                                 </p:cTn>
                               </p:par>
-                            </p:childTnLst>
-                          </p:cTn>
-                        </p:par>
-                      </p:childTnLst>
-                    </p:cTn>
-                  </p:par>
-                  <p:par>
-                    <p:cTn id="31" fill="hold">
-                      <p:stCondLst>
-                        <p:cond delay="indefinite"/>
-                      </p:stCondLst>
-                      <p:childTnLst>
-                        <p:par>
-                          <p:cTn id="32" fill="hold">
-                            <p:stCondLst>
-                              <p:cond delay="0"/>
-                            </p:stCondLst>
-                            <p:childTnLst>
                               <p:par>
-                                <p:cTn id="33" presetID="1" presetClass="entr" presetSubtype="0" fill="hold" grpId="0" nodeType="clickEffect">
+                                <p:cTn id="31" presetID="1" presetClass="entr" presetSubtype="0" fill="hold" grpId="0" nodeType="withEffect">
                                   <p:stCondLst>
                                     <p:cond delay="0"/>
                                   </p:stCondLst>
                                   <p:childTnLst>
                                     <p:set>
                                       <p:cBhvr>
-                                        <p:cTn id="34" dur="1" fill="hold">
-                                          <p:stCondLst>
-                                            <p:cond delay="0"/>
-                                          </p:stCondLst>
-                                        </p:cTn>
-                                        <p:tgtEl>
-                                          <p:spTgt spid="36"/>
-                                        </p:tgtEl>
-                                        <p:attrNameLst>
-                                          <p:attrName>style.visibility</p:attrName>
-                                        </p:attrNameLst>
-                                      </p:cBhvr>
-                                      <p:to>
-                                        <p:strVal val="visible"/>
-                                      </p:to>
-                                    </p:set>
-                                  </p:childTnLst>
-                                </p:cTn>
-                              </p:par>
-                            </p:childTnLst>
-                          </p:cTn>
-                        </p:par>
-                        <p:par>
-                          <p:cTn id="35" fill="hold">
-                            <p:stCondLst>
-                              <p:cond delay="0"/>
-                            </p:stCondLst>
-                            <p:childTnLst>
-                              <p:par>
-                                <p:cTn id="36" presetID="1" presetClass="entr" presetSubtype="0" fill="hold" grpId="0" nodeType="afterEffect">
-                                  <p:stCondLst>
-                                    <p:cond delay="0"/>
-                                  </p:stCondLst>
-                                  <p:childTnLst>
-                                    <p:set>
-                                      <p:cBhvr>
-                                        <p:cTn id="37" dur="1" fill="hold">
-                                          <p:stCondLst>
-                                            <p:cond delay="0"/>
-                                          </p:stCondLst>
-                                        </p:cTn>
-                                        <p:tgtEl>
-                                          <p:spTgt spid="37"/>
-                                        </p:tgtEl>
-                                        <p:attrNameLst>
-                                          <p:attrName>style.visibility</p:attrName>
-                                        </p:attrNameLst>
-                                      </p:cBhvr>
-                                      <p:to>
-                                        <p:strVal val="visible"/>
-                                      </p:to>
-                                    </p:set>
-                                  </p:childTnLst>
-                                </p:cTn>
-                              </p:par>
-                            </p:childTnLst>
-                          </p:cTn>
-                        </p:par>
-                        <p:par>
-                          <p:cTn id="38" fill="hold">
-                            <p:stCondLst>
-                              <p:cond delay="0"/>
-                            </p:stCondLst>
-                            <p:childTnLst>
-                              <p:par>
-                                <p:cTn id="39" presetID="1" presetClass="entr" presetSubtype="0" fill="hold" grpId="0" nodeType="afterEffect">
-                                  <p:stCondLst>
-                                    <p:cond delay="0"/>
-                                  </p:stCondLst>
-                                  <p:childTnLst>
-                                    <p:set>
-                                      <p:cBhvr>
-                                        <p:cTn id="40" dur="1" fill="hold">
-                                          <p:stCondLst>
-                                            <p:cond delay="0"/>
-                                          </p:stCondLst>
-                                        </p:cTn>
-                                        <p:tgtEl>
-                                          <p:spTgt spid="40"/>
-                                        </p:tgtEl>
-                                        <p:attrNameLst>
-                                          <p:attrName>style.visibility</p:attrName>
-                                        </p:attrNameLst>
-                                      </p:cBhvr>
-                                      <p:to>
-                                        <p:strVal val="visible"/>
-                                      </p:to>
-                                    </p:set>
-                                  </p:childTnLst>
-                                </p:cTn>
-                              </p:par>
-                            </p:childTnLst>
-                          </p:cTn>
-                        </p:par>
-                        <p:par>
-                          <p:cTn id="41" fill="hold">
-                            <p:stCondLst>
-                              <p:cond delay="0"/>
-                            </p:stCondLst>
-                            <p:childTnLst>
-                              <p:par>
-                                <p:cTn id="42" presetID="1" presetClass="entr" presetSubtype="0" fill="hold" grpId="0" nodeType="afterEffect">
-                                  <p:stCondLst>
-                                    <p:cond delay="0"/>
-                                  </p:stCondLst>
-                                  <p:childTnLst>
-                                    <p:set>
-                                      <p:cBhvr>
-                                        <p:cTn id="43" dur="1" fill="hold">
-                                          <p:stCondLst>
-                                            <p:cond delay="0"/>
-                                          </p:stCondLst>
-                                        </p:cTn>
-                                        <p:tgtEl>
-                                          <p:spTgt spid="41"/>
-                                        </p:tgtEl>
-                                        <p:attrNameLst>
-                                          <p:attrName>style.visibility</p:attrName>
-                                        </p:attrNameLst>
-                                      </p:cBhvr>
-                                      <p:to>
-                                        <p:strVal val="visible"/>
-                                      </p:to>
-                                    </p:set>
-                                  </p:childTnLst>
-                                </p:cTn>
-                              </p:par>
-                              <p:par>
-                                <p:cTn id="44" presetID="1" presetClass="entr" presetSubtype="0" fill="hold" grpId="0" nodeType="withEffect">
-                                  <p:stCondLst>
-                                    <p:cond delay="0"/>
-                                  </p:stCondLst>
-                                  <p:childTnLst>
-                                    <p:set>
-                                      <p:cBhvr>
-                                        <p:cTn id="45" dur="1" fill="hold">
+                                        <p:cTn id="32" dur="1" fill="hold">
                                           <p:stCondLst>
                                             <p:cond delay="0"/>
                                           </p:stCondLst>
                                         </p:cTn>
                                         <p:tgtEl>
                                           <p:spTgt spid="43"/>
-                                        </p:tgtEl>
-                                        <p:attrNameLst>
-                                          <p:attrName>style.visibility</p:attrName>
-                                        </p:attrNameLst>
-                                      </p:cBhvr>
-                                      <p:to>
-                                        <p:strVal val="visible"/>
-                                      </p:to>
-                                    </p:set>
-                                  </p:childTnLst>
-                                </p:cTn>
-                              </p:par>
-                            </p:childTnLst>
-                          </p:cTn>
-                        </p:par>
-                      </p:childTnLst>
-                    </p:cTn>
-                  </p:par>
-                  <p:par>
-                    <p:cTn id="46" fill="hold">
-                      <p:stCondLst>
-                        <p:cond delay="indefinite"/>
-                      </p:stCondLst>
-                      <p:childTnLst>
-                        <p:par>
-                          <p:cTn id="47" fill="hold">
-                            <p:stCondLst>
-                              <p:cond delay="0"/>
-                            </p:stCondLst>
-                            <p:childTnLst>
-                              <p:par>
-                                <p:cTn id="48" presetID="1" presetClass="entr" presetSubtype="0" fill="hold" grpId="0" nodeType="clickEffect">
-                                  <p:stCondLst>
-                                    <p:cond delay="0"/>
-                                  </p:stCondLst>
-                                  <p:childTnLst>
-                                    <p:set>
-                                      <p:cBhvr>
-                                        <p:cTn id="49" dur="1" fill="hold">
-                                          <p:stCondLst>
-                                            <p:cond delay="0"/>
-                                          </p:stCondLst>
-                                        </p:cTn>
-                                        <p:tgtEl>
-                                          <p:spTgt spid="38"/>
-                                        </p:tgtEl>
-                                        <p:attrNameLst>
-                                          <p:attrName>style.visibility</p:attrName>
-                                        </p:attrNameLst>
-                                      </p:cBhvr>
-                                      <p:to>
-                                        <p:strVal val="visible"/>
-                                      </p:to>
-                                    </p:set>
-                                  </p:childTnLst>
-                                </p:cTn>
-                              </p:par>
-                              <p:par>
-                                <p:cTn id="50" presetID="1" presetClass="entr" presetSubtype="0" fill="hold" grpId="0" nodeType="withEffect">
-                                  <p:stCondLst>
-                                    <p:cond delay="0"/>
-                                  </p:stCondLst>
-                                  <p:childTnLst>
-                                    <p:set>
-                                      <p:cBhvr>
-                                        <p:cTn id="51" dur="1" fill="hold">
-                                          <p:stCondLst>
-                                            <p:cond delay="0"/>
-                                          </p:stCondLst>
-                                        </p:cTn>
-                                        <p:tgtEl>
-                                          <p:spTgt spid="39"/>
-                                        </p:tgtEl>
-                                        <p:attrNameLst>
-                                          <p:attrName>style.visibility</p:attrName>
-                                        </p:attrNameLst>
-                                      </p:cBhvr>
-                                      <p:to>
-                                        <p:strVal val="visible"/>
-                                      </p:to>
-                                    </p:set>
-                                  </p:childTnLst>
-                                </p:cTn>
-                              </p:par>
-                              <p:par>
-                                <p:cTn id="52" presetID="1" presetClass="entr" presetSubtype="0" fill="hold" grpId="0" nodeType="withEffect">
-                                  <p:stCondLst>
-                                    <p:cond delay="0"/>
-                                  </p:stCondLst>
-                                  <p:childTnLst>
-                                    <p:set>
-                                      <p:cBhvr>
-                                        <p:cTn id="53" dur="1" fill="hold">
-                                          <p:stCondLst>
-                                            <p:cond delay="0"/>
-                                          </p:stCondLst>
-                                        </p:cTn>
-                                        <p:tgtEl>
-                                          <p:spTgt spid="42"/>
-                                        </p:tgtEl>
-                                        <p:attrNameLst>
-                                          <p:attrName>style.visibility</p:attrName>
-                                        </p:attrNameLst>
-                                      </p:cBhvr>
-                                      <p:to>
-                                        <p:strVal val="visible"/>
-                                      </p:to>
-                                    </p:set>
-                                  </p:childTnLst>
-                                </p:cTn>
-                              </p:par>
-                            </p:childTnLst>
-                          </p:cTn>
-                        </p:par>
-                      </p:childTnLst>
-                    </p:cTn>
-                  </p:par>
-                  <p:par>
-                    <p:cTn id="54" fill="hold">
-                      <p:stCondLst>
-                        <p:cond delay="indefinite"/>
-                      </p:stCondLst>
-                      <p:childTnLst>
-                        <p:par>
-                          <p:cTn id="55" fill="hold">
-                            <p:stCondLst>
-                              <p:cond delay="0"/>
-                            </p:stCondLst>
-                            <p:childTnLst>
-                              <p:par>
-                                <p:cTn id="56" presetID="1" presetClass="entr" presetSubtype="0" fill="hold" grpId="0" nodeType="clickEffect">
-                                  <p:stCondLst>
-                                    <p:cond delay="0"/>
-                                  </p:stCondLst>
-                                  <p:childTnLst>
-                                    <p:set>
-                                      <p:cBhvr>
-                                        <p:cTn id="57" dur="1" fill="hold">
-                                          <p:stCondLst>
-                                            <p:cond delay="0"/>
-                                          </p:stCondLst>
-                                        </p:cTn>
-                                        <p:tgtEl>
-                                          <p:spTgt spid="44"/>
                                         </p:tgtEl>
                                         <p:attrNameLst>
                                           <p:attrName>style.visibility</p:attrName>
@@ -7995,15 +6643,7 @@
       <p:bldP spid="33" grpId="0"/>
       <p:bldP spid="34" grpId="0" animBg="1"/>
       <p:bldP spid="35" grpId="0" animBg="1"/>
-      <p:bldP spid="36" grpId="0" animBg="1"/>
-      <p:bldP spid="37" grpId="0" animBg="1"/>
-      <p:bldP spid="38" grpId="0"/>
-      <p:bldP spid="39" grpId="0"/>
-      <p:bldP spid="40" grpId="0" animBg="1"/>
-      <p:bldP spid="41" grpId="0" animBg="1"/>
-      <p:bldP spid="42" grpId="0"/>
       <p:bldP spid="43" grpId="0"/>
-      <p:bldP spid="44" grpId="0"/>
     </p:bldLst>
   </p:timing>
 </p:sld>

</xml_diff>

<commit_message>
Fixes slide to say 26bp, not 35bp
</commit_message>
<xml_diff>
--- a/Paper/Slides/SlideFigures/InterestRateExposureChannel.pptx
+++ b/Paper/Slides/SlideFigures/InterestRateExposureChannel.pptx
@@ -261,7 +261,7 @@
           <a:p>
             <a:fld id="{23D77BCE-F76E-4A53-B457-B198FEE3CCBD}" type="datetimeFigureOut">
               <a:rPr lang="en-US" smtClean="0"/>
-              <a:t>9/12/2018</a:t>
+              <a:t>9/24/2018</a:t>
             </a:fld>
             <a:endParaRPr lang="en-US"/>
           </a:p>
@@ -459,7 +459,7 @@
           <a:p>
             <a:fld id="{23D77BCE-F76E-4A53-B457-B198FEE3CCBD}" type="datetimeFigureOut">
               <a:rPr lang="en-US" smtClean="0"/>
-              <a:t>9/12/2018</a:t>
+              <a:t>9/24/2018</a:t>
             </a:fld>
             <a:endParaRPr lang="en-US"/>
           </a:p>
@@ -667,7 +667,7 @@
           <a:p>
             <a:fld id="{23D77BCE-F76E-4A53-B457-B198FEE3CCBD}" type="datetimeFigureOut">
               <a:rPr lang="en-US" smtClean="0"/>
-              <a:t>9/12/2018</a:t>
+              <a:t>9/24/2018</a:t>
             </a:fld>
             <a:endParaRPr lang="en-US"/>
           </a:p>
@@ -865,7 +865,7 @@
           <a:p>
             <a:fld id="{23D77BCE-F76E-4A53-B457-B198FEE3CCBD}" type="datetimeFigureOut">
               <a:rPr lang="en-US" smtClean="0"/>
-              <a:t>9/12/2018</a:t>
+              <a:t>9/24/2018</a:t>
             </a:fld>
             <a:endParaRPr lang="en-US"/>
           </a:p>
@@ -1140,7 +1140,7 @@
           <a:p>
             <a:fld id="{23D77BCE-F76E-4A53-B457-B198FEE3CCBD}" type="datetimeFigureOut">
               <a:rPr lang="en-US" smtClean="0"/>
-              <a:t>9/12/2018</a:t>
+              <a:t>9/24/2018</a:t>
             </a:fld>
             <a:endParaRPr lang="en-US"/>
           </a:p>
@@ -1405,7 +1405,7 @@
           <a:p>
             <a:fld id="{23D77BCE-F76E-4A53-B457-B198FEE3CCBD}" type="datetimeFigureOut">
               <a:rPr lang="en-US" smtClean="0"/>
-              <a:t>9/12/2018</a:t>
+              <a:t>9/24/2018</a:t>
             </a:fld>
             <a:endParaRPr lang="en-US"/>
           </a:p>
@@ -1817,7 +1817,7 @@
           <a:p>
             <a:fld id="{23D77BCE-F76E-4A53-B457-B198FEE3CCBD}" type="datetimeFigureOut">
               <a:rPr lang="en-US" smtClean="0"/>
-              <a:t>9/12/2018</a:t>
+              <a:t>9/24/2018</a:t>
             </a:fld>
             <a:endParaRPr lang="en-US"/>
           </a:p>
@@ -1958,7 +1958,7 @@
           <a:p>
             <a:fld id="{23D77BCE-F76E-4A53-B457-B198FEE3CCBD}" type="datetimeFigureOut">
               <a:rPr lang="en-US" smtClean="0"/>
-              <a:t>9/12/2018</a:t>
+              <a:t>9/24/2018</a:t>
             </a:fld>
             <a:endParaRPr lang="en-US"/>
           </a:p>
@@ -2071,7 +2071,7 @@
           <a:p>
             <a:fld id="{23D77BCE-F76E-4A53-B457-B198FEE3CCBD}" type="datetimeFigureOut">
               <a:rPr lang="en-US" smtClean="0"/>
-              <a:t>9/12/2018</a:t>
+              <a:t>9/24/2018</a:t>
             </a:fld>
             <a:endParaRPr lang="en-US"/>
           </a:p>
@@ -2382,7 +2382,7 @@
           <a:p>
             <a:fld id="{23D77BCE-F76E-4A53-B457-B198FEE3CCBD}" type="datetimeFigureOut">
               <a:rPr lang="en-US" smtClean="0"/>
-              <a:t>9/12/2018</a:t>
+              <a:t>9/24/2018</a:t>
             </a:fld>
             <a:endParaRPr lang="en-US"/>
           </a:p>
@@ -2670,7 +2670,7 @@
           <a:p>
             <a:fld id="{23D77BCE-F76E-4A53-B457-B198FEE3CCBD}" type="datetimeFigureOut">
               <a:rPr lang="en-US" smtClean="0"/>
-              <a:t>9/12/2018</a:t>
+              <a:t>9/24/2018</a:t>
             </a:fld>
             <a:endParaRPr lang="en-US"/>
           </a:p>
@@ -2911,7 +2911,7 @@
           <a:p>
             <a:fld id="{23D77BCE-F76E-4A53-B457-B198FEE3CCBD}" type="datetimeFigureOut">
               <a:rPr lang="en-US" smtClean="0"/>
-              <a:t>9/12/2018</a:t>
+              <a:t>9/24/2018</a:t>
             </a:fld>
             <a:endParaRPr lang="en-US"/>
           </a:p>
@@ -6184,11 +6184,19 @@
             </a:r>
             <a:r>
               <a:rPr lang="en-US" sz="2200" dirty="0"/>
-              <a:t> interest rate hike reduces aggregate expenditure by </a:t>
+              <a:t> interest rate hike reduces aggregate expenditure </a:t>
+            </a:r>
+            <a:r>
+              <a:rPr lang="en-US" sz="2200"/>
+              <a:t>by </a:t>
+            </a:r>
+            <a:r>
+              <a:rPr lang="en-US" sz="2200" b="1"/>
+              <a:t>26 </a:t>
             </a:r>
             <a:r>
               <a:rPr lang="en-US" sz="2200" b="1" dirty="0"/>
-              <a:t>35 basis points</a:t>
+              <a:t>basis points</a:t>
             </a:r>
             <a:r>
               <a:rPr lang="en-US" sz="2200" dirty="0"/>

</xml_diff>

<commit_message>
Updates slide picture to reflect > rather than >>
</commit_message>
<xml_diff>
--- a/Paper/Slides/SlideFigures/InterestRateExposureChannel.pptx
+++ b/Paper/Slides/SlideFigures/InterestRateExposureChannel.pptx
@@ -114,6 +114,35 @@
 </p:presentation>
 </file>
 
+<file path=ppt/changesInfos/changesInfo1.xml><?xml version="1.0" encoding="utf-8"?>
+<pc:chgInfo xmlns:a="http://schemas.openxmlformats.org/drawingml/2006/main" xmlns:r="http://schemas.openxmlformats.org/officeDocument/2006/relationships" xmlns:ac="http://schemas.microsoft.com/office/drawing/2013/main/command" xmlns:pc="http://schemas.microsoft.com/office/powerpoint/2013/main/command">
+  <pc:docChgLst>
+    <pc:chgData name="Edmund Crawley" userId="5604ff08deb8de49" providerId="LiveId" clId="{BB716CC7-33C1-419F-81E5-9E0428DA5772}"/>
+    <pc:docChg chg="modSld">
+      <pc:chgData name="Edmund Crawley" userId="5604ff08deb8de49" providerId="LiveId" clId="{BB716CC7-33C1-419F-81E5-9E0428DA5772}" dt="2018-09-26T18:08:25.765" v="0" actId="20577"/>
+      <pc:docMkLst>
+        <pc:docMk/>
+      </pc:docMkLst>
+      <pc:sldChg chg="modSp">
+        <pc:chgData name="Edmund Crawley" userId="5604ff08deb8de49" providerId="LiveId" clId="{BB716CC7-33C1-419F-81E5-9E0428DA5772}" dt="2018-09-26T18:08:25.765" v="0" actId="20577"/>
+        <pc:sldMkLst>
+          <pc:docMk/>
+          <pc:sldMk cId="3824343056" sldId="258"/>
+        </pc:sldMkLst>
+        <pc:spChg chg="mod">
+          <ac:chgData name="Edmund Crawley" userId="5604ff08deb8de49" providerId="LiveId" clId="{BB716CC7-33C1-419F-81E5-9E0428DA5772}" dt="2018-09-26T18:08:25.765" v="0" actId="20577"/>
+          <ac:spMkLst>
+            <pc:docMk/>
+            <pc:sldMk cId="3824343056" sldId="258"/>
+            <ac:spMk id="43" creationId="{C3559FD1-3806-4A8A-934C-967ADA2EBC5A}"/>
+          </ac:spMkLst>
+        </pc:spChg>
+      </pc:sldChg>
+    </pc:docChg>
+  </pc:docChgLst>
+</pc:chgInfo>
+</file>
+
 <file path=ppt/slideLayouts/slideLayout1.xml><?xml version="1.0" encoding="utf-8"?>
 <p:sldLayout xmlns:a="http://schemas.openxmlformats.org/drawingml/2006/main" xmlns:r="http://schemas.openxmlformats.org/officeDocument/2006/relationships" xmlns:p="http://schemas.openxmlformats.org/presentationml/2006/main" type="title" preserve="1">
   <p:cSld name="Title Slide">
@@ -261,7 +290,7 @@
           <a:p>
             <a:fld id="{23D77BCE-F76E-4A53-B457-B198FEE3CCBD}" type="datetimeFigureOut">
               <a:rPr lang="en-US" smtClean="0"/>
-              <a:t>9/24/2018</a:t>
+              <a:t>9/26/2018</a:t>
             </a:fld>
             <a:endParaRPr lang="en-US"/>
           </a:p>
@@ -459,7 +488,7 @@
           <a:p>
             <a:fld id="{23D77BCE-F76E-4A53-B457-B198FEE3CCBD}" type="datetimeFigureOut">
               <a:rPr lang="en-US" smtClean="0"/>
-              <a:t>9/24/2018</a:t>
+              <a:t>9/26/2018</a:t>
             </a:fld>
             <a:endParaRPr lang="en-US"/>
           </a:p>
@@ -667,7 +696,7 @@
           <a:p>
             <a:fld id="{23D77BCE-F76E-4A53-B457-B198FEE3CCBD}" type="datetimeFigureOut">
               <a:rPr lang="en-US" smtClean="0"/>
-              <a:t>9/24/2018</a:t>
+              <a:t>9/26/2018</a:t>
             </a:fld>
             <a:endParaRPr lang="en-US"/>
           </a:p>
@@ -865,7 +894,7 @@
           <a:p>
             <a:fld id="{23D77BCE-F76E-4A53-B457-B198FEE3CCBD}" type="datetimeFigureOut">
               <a:rPr lang="en-US" smtClean="0"/>
-              <a:t>9/24/2018</a:t>
+              <a:t>9/26/2018</a:t>
             </a:fld>
             <a:endParaRPr lang="en-US"/>
           </a:p>
@@ -1140,7 +1169,7 @@
           <a:p>
             <a:fld id="{23D77BCE-F76E-4A53-B457-B198FEE3CCBD}" type="datetimeFigureOut">
               <a:rPr lang="en-US" smtClean="0"/>
-              <a:t>9/24/2018</a:t>
+              <a:t>9/26/2018</a:t>
             </a:fld>
             <a:endParaRPr lang="en-US"/>
           </a:p>
@@ -1405,7 +1434,7 @@
           <a:p>
             <a:fld id="{23D77BCE-F76E-4A53-B457-B198FEE3CCBD}" type="datetimeFigureOut">
               <a:rPr lang="en-US" smtClean="0"/>
-              <a:t>9/24/2018</a:t>
+              <a:t>9/26/2018</a:t>
             </a:fld>
             <a:endParaRPr lang="en-US"/>
           </a:p>
@@ -1817,7 +1846,7 @@
           <a:p>
             <a:fld id="{23D77BCE-F76E-4A53-B457-B198FEE3CCBD}" type="datetimeFigureOut">
               <a:rPr lang="en-US" smtClean="0"/>
-              <a:t>9/24/2018</a:t>
+              <a:t>9/26/2018</a:t>
             </a:fld>
             <a:endParaRPr lang="en-US"/>
           </a:p>
@@ -1958,7 +1987,7 @@
           <a:p>
             <a:fld id="{23D77BCE-F76E-4A53-B457-B198FEE3CCBD}" type="datetimeFigureOut">
               <a:rPr lang="en-US" smtClean="0"/>
-              <a:t>9/24/2018</a:t>
+              <a:t>9/26/2018</a:t>
             </a:fld>
             <a:endParaRPr lang="en-US"/>
           </a:p>
@@ -2071,7 +2100,7 @@
           <a:p>
             <a:fld id="{23D77BCE-F76E-4A53-B457-B198FEE3CCBD}" type="datetimeFigureOut">
               <a:rPr lang="en-US" smtClean="0"/>
-              <a:t>9/24/2018</a:t>
+              <a:t>9/26/2018</a:t>
             </a:fld>
             <a:endParaRPr lang="en-US"/>
           </a:p>
@@ -2382,7 +2411,7 @@
           <a:p>
             <a:fld id="{23D77BCE-F76E-4A53-B457-B198FEE3CCBD}" type="datetimeFigureOut">
               <a:rPr lang="en-US" smtClean="0"/>
-              <a:t>9/24/2018</a:t>
+              <a:t>9/26/2018</a:t>
             </a:fld>
             <a:endParaRPr lang="en-US"/>
           </a:p>
@@ -2670,7 +2699,7 @@
           <a:p>
             <a:fld id="{23D77BCE-F76E-4A53-B457-B198FEE3CCBD}" type="datetimeFigureOut">
               <a:rPr lang="en-US" smtClean="0"/>
-              <a:t>9/24/2018</a:t>
+              <a:t>9/26/2018</a:t>
             </a:fld>
             <a:endParaRPr lang="en-US"/>
           </a:p>
@@ -2911,7 +2940,7 @@
           <a:p>
             <a:fld id="{23D77BCE-F76E-4A53-B457-B198FEE3CCBD}" type="datetimeFigureOut">
               <a:rPr lang="en-US" smtClean="0"/>
-              <a:t>9/24/2018</a:t>
+              <a:t>9/26/2018</a:t>
             </a:fld>
             <a:endParaRPr lang="en-US"/>
           </a:p>
@@ -6184,19 +6213,11 @@
             </a:r>
             <a:r>
               <a:rPr lang="en-US" sz="2200" dirty="0"/>
-              <a:t> interest rate hike reduces aggregate expenditure </a:t>
-            </a:r>
-            <a:r>
-              <a:rPr lang="en-US" sz="2200"/>
-              <a:t>by </a:t>
-            </a:r>
-            <a:r>
-              <a:rPr lang="en-US" sz="2200" b="1"/>
-              <a:t>26 </a:t>
+              <a:t> interest rate hike reduces aggregate expenditure by </a:t>
             </a:r>
             <a:r>
               <a:rPr lang="en-US" sz="2200" b="1" dirty="0"/>
-              <a:t>basis points</a:t>
+              <a:t>26 basis points</a:t>
             </a:r>
             <a:r>
               <a:rPr lang="en-US" sz="2200" dirty="0"/>
@@ -6216,8 +6237,12 @@
           </a:p>
           <a:p>
             <a:r>
+              <a:rPr lang="en-US" sz="2200" b="1"/>
+              <a:t>Redistribution &gt; </a:t>
+            </a:r>
+            <a:r>
               <a:rPr lang="en-US" sz="2200" b="1" dirty="0"/>
-              <a:t>Redistribution &gt;&gt; Intertemporal Substitution</a:t>
+              <a:t>Intertemporal Substitution</a:t>
             </a:r>
           </a:p>
         </p:txBody>

</xml_diff>

<commit_message>
Overhall of introduction and empirical strategy slides
</commit_message>
<xml_diff>
--- a/Paper/Slides/SlideFigures/InterestRateExposureChannel.pptx
+++ b/Paper/Slides/SlideFigures/InterestRateExposureChannel.pptx
@@ -8,6 +8,7 @@
     <p:sldId id="256" r:id="rId2"/>
     <p:sldId id="257" r:id="rId3"/>
     <p:sldId id="258" r:id="rId4"/>
+    <p:sldId id="259" r:id="rId5"/>
   </p:sldIdLst>
   <p:sldSz cx="12192000" cy="6858000"/>
   <p:notesSz cx="6858000" cy="9144000"/>
@@ -118,8 +119,8 @@
 <pc:chgInfo xmlns:a="http://schemas.openxmlformats.org/drawingml/2006/main" xmlns:r="http://schemas.openxmlformats.org/officeDocument/2006/relationships" xmlns:ac="http://schemas.microsoft.com/office/drawing/2013/main/command" xmlns:pc="http://schemas.microsoft.com/office/powerpoint/2013/main/command">
   <pc:docChgLst>
     <pc:chgData name="Edmund Crawley" userId="5604ff08deb8de49" providerId="LiveId" clId="{BB716CC7-33C1-419F-81E5-9E0428DA5772}"/>
-    <pc:docChg chg="modSld">
-      <pc:chgData name="Edmund Crawley" userId="5604ff08deb8de49" providerId="LiveId" clId="{BB716CC7-33C1-419F-81E5-9E0428DA5772}" dt="2018-09-26T18:08:25.765" v="0" actId="20577"/>
+    <pc:docChg chg="undo custSel addSld modSld">
+      <pc:chgData name="Edmund Crawley" userId="5604ff08deb8de49" providerId="LiveId" clId="{BB716CC7-33C1-419F-81E5-9E0428DA5772}" dt="2018-10-09T16:11:21.504" v="845" actId="20577"/>
       <pc:docMkLst>
         <pc:docMk/>
       </pc:docMkLst>
@@ -137,6 +138,285 @@
             <ac:spMk id="43" creationId="{C3559FD1-3806-4A8A-934C-967ADA2EBC5A}"/>
           </ac:spMkLst>
         </pc:spChg>
+      </pc:sldChg>
+      <pc:sldChg chg="addSp delSp modSp add delAnim modAnim">
+        <pc:chgData name="Edmund Crawley" userId="5604ff08deb8de49" providerId="LiveId" clId="{BB716CC7-33C1-419F-81E5-9E0428DA5772}" dt="2018-10-09T16:11:21.504" v="845" actId="20577"/>
+        <pc:sldMkLst>
+          <pc:docMk/>
+          <pc:sldMk cId="583786206" sldId="259"/>
+        </pc:sldMkLst>
+        <pc:spChg chg="del">
+          <ac:chgData name="Edmund Crawley" userId="5604ff08deb8de49" providerId="LiveId" clId="{BB716CC7-33C1-419F-81E5-9E0428DA5772}" dt="2018-10-09T14:58:14.453" v="2" actId="478"/>
+          <ac:spMkLst>
+            <pc:docMk/>
+            <pc:sldMk cId="583786206" sldId="259"/>
+            <ac:spMk id="2" creationId="{B8B2E5B0-C7A6-45A7-9BBF-4C20E4862AA2}"/>
+          </ac:spMkLst>
+        </pc:spChg>
+        <pc:spChg chg="del">
+          <ac:chgData name="Edmund Crawley" userId="5604ff08deb8de49" providerId="LiveId" clId="{BB716CC7-33C1-419F-81E5-9E0428DA5772}" dt="2018-10-09T14:58:17.344" v="3" actId="478"/>
+          <ac:spMkLst>
+            <pc:docMk/>
+            <pc:sldMk cId="583786206" sldId="259"/>
+            <ac:spMk id="3" creationId="{9BC9E290-05DD-4C51-B76F-349C13F30D07}"/>
+          </ac:spMkLst>
+        </pc:spChg>
+        <pc:spChg chg="add">
+          <ac:chgData name="Edmund Crawley" userId="5604ff08deb8de49" providerId="LiveId" clId="{BB716CC7-33C1-419F-81E5-9E0428DA5772}" dt="2018-10-09T14:58:44.477" v="6"/>
+          <ac:spMkLst>
+            <pc:docMk/>
+            <pc:sldMk cId="583786206" sldId="259"/>
+            <ac:spMk id="5" creationId="{D15DDA08-9D9B-4A09-A8F2-5F37E4AC298E}"/>
+          </ac:spMkLst>
+        </pc:spChg>
+        <pc:spChg chg="add">
+          <ac:chgData name="Edmund Crawley" userId="5604ff08deb8de49" providerId="LiveId" clId="{BB716CC7-33C1-419F-81E5-9E0428DA5772}" dt="2018-10-09T14:58:44.477" v="6"/>
+          <ac:spMkLst>
+            <pc:docMk/>
+            <pc:sldMk cId="583786206" sldId="259"/>
+            <ac:spMk id="6" creationId="{B36BBF4E-BAA4-4333-B128-C32F33D4D71F}"/>
+          </ac:spMkLst>
+        </pc:spChg>
+        <pc:spChg chg="add mod">
+          <ac:chgData name="Edmund Crawley" userId="5604ff08deb8de49" providerId="LiveId" clId="{BB716CC7-33C1-419F-81E5-9E0428DA5772}" dt="2018-10-09T15:08:48.081" v="46" actId="207"/>
+          <ac:spMkLst>
+            <pc:docMk/>
+            <pc:sldMk cId="583786206" sldId="259"/>
+            <ac:spMk id="9" creationId="{4275FF9A-880E-4595-83EF-6CF0DBE68DE9}"/>
+          </ac:spMkLst>
+        </pc:spChg>
+        <pc:spChg chg="add del">
+          <ac:chgData name="Edmund Crawley" userId="5604ff08deb8de49" providerId="LiveId" clId="{BB716CC7-33C1-419F-81E5-9E0428DA5772}" dt="2018-10-09T14:59:11.317" v="13" actId="478"/>
+          <ac:spMkLst>
+            <pc:docMk/>
+            <pc:sldMk cId="583786206" sldId="259"/>
+            <ac:spMk id="11" creationId="{20B4ADE4-69EB-4804-94DE-1159D56D0F59}"/>
+          </ac:spMkLst>
+        </pc:spChg>
+        <pc:spChg chg="add del">
+          <ac:chgData name="Edmund Crawley" userId="5604ff08deb8de49" providerId="LiveId" clId="{BB716CC7-33C1-419F-81E5-9E0428DA5772}" dt="2018-10-09T14:59:55.466" v="19" actId="478"/>
+          <ac:spMkLst>
+            <pc:docMk/>
+            <pc:sldMk cId="583786206" sldId="259"/>
+            <ac:spMk id="12" creationId="{38D5166E-F56C-48EB-8168-C5C3E941951A}"/>
+          </ac:spMkLst>
+        </pc:spChg>
+        <pc:spChg chg="add del">
+          <ac:chgData name="Edmund Crawley" userId="5604ff08deb8de49" providerId="LiveId" clId="{BB716CC7-33C1-419F-81E5-9E0428DA5772}" dt="2018-10-09T14:59:01.641" v="11" actId="478"/>
+          <ac:spMkLst>
+            <pc:docMk/>
+            <pc:sldMk cId="583786206" sldId="259"/>
+            <ac:spMk id="13" creationId="{D07B2B16-715A-43C0-9986-BA4A48CCF612}"/>
+          </ac:spMkLst>
+        </pc:spChg>
+        <pc:spChg chg="add del">
+          <ac:chgData name="Edmund Crawley" userId="5604ff08deb8de49" providerId="LiveId" clId="{BB716CC7-33C1-419F-81E5-9E0428DA5772}" dt="2018-10-09T15:00:49.164" v="27" actId="478"/>
+          <ac:spMkLst>
+            <pc:docMk/>
+            <pc:sldMk cId="583786206" sldId="259"/>
+            <ac:spMk id="14" creationId="{0158D156-238F-4AD7-88C7-FF0371D99229}"/>
+          </ac:spMkLst>
+        </pc:spChg>
+        <pc:spChg chg="add del">
+          <ac:chgData name="Edmund Crawley" userId="5604ff08deb8de49" providerId="LiveId" clId="{BB716CC7-33C1-419F-81E5-9E0428DA5772}" dt="2018-10-09T14:59:05.491" v="12" actId="478"/>
+          <ac:spMkLst>
+            <pc:docMk/>
+            <pc:sldMk cId="583786206" sldId="259"/>
+            <ac:spMk id="15" creationId="{8074CAE3-68EC-411C-8E0D-F3BFC593287D}"/>
+          </ac:spMkLst>
+        </pc:spChg>
+        <pc:spChg chg="add del">
+          <ac:chgData name="Edmund Crawley" userId="5604ff08deb8de49" providerId="LiveId" clId="{BB716CC7-33C1-419F-81E5-9E0428DA5772}" dt="2018-10-09T15:00:52.768" v="28" actId="478"/>
+          <ac:spMkLst>
+            <pc:docMk/>
+            <pc:sldMk cId="583786206" sldId="259"/>
+            <ac:spMk id="16" creationId="{A497D726-E8FB-4DD6-8A7E-F97FE50CBFB3}"/>
+          </ac:spMkLst>
+        </pc:spChg>
+        <pc:spChg chg="add del mod">
+          <ac:chgData name="Edmund Crawley" userId="5604ff08deb8de49" providerId="LiveId" clId="{BB716CC7-33C1-419F-81E5-9E0428DA5772}" dt="2018-10-09T15:39:07.715" v="73" actId="478"/>
+          <ac:spMkLst>
+            <pc:docMk/>
+            <pc:sldMk cId="583786206" sldId="259"/>
+            <ac:spMk id="17" creationId="{5BF62615-2C26-49D1-B6F0-5675C57059A3}"/>
+          </ac:spMkLst>
+        </pc:spChg>
+        <pc:spChg chg="add mod">
+          <ac:chgData name="Edmund Crawley" userId="5604ff08deb8de49" providerId="LiveId" clId="{BB716CC7-33C1-419F-81E5-9E0428DA5772}" dt="2018-10-09T15:40:03.390" v="86" actId="1038"/>
+          <ac:spMkLst>
+            <pc:docMk/>
+            <pc:sldMk cId="583786206" sldId="259"/>
+            <ac:spMk id="19" creationId="{436CF46A-C488-4D7C-B9E8-0E24163F0B8F}"/>
+          </ac:spMkLst>
+        </pc:spChg>
+        <pc:spChg chg="add mod">
+          <ac:chgData name="Edmund Crawley" userId="5604ff08deb8de49" providerId="LiveId" clId="{BB716CC7-33C1-419F-81E5-9E0428DA5772}" dt="2018-10-09T15:38:27.957" v="70" actId="1076"/>
+          <ac:spMkLst>
+            <pc:docMk/>
+            <pc:sldMk cId="583786206" sldId="259"/>
+            <ac:spMk id="20" creationId="{C27495A8-903F-487F-B981-56ECA6C9A964}"/>
+          </ac:spMkLst>
+        </pc:spChg>
+        <pc:spChg chg="add mod">
+          <ac:chgData name="Edmund Crawley" userId="5604ff08deb8de49" providerId="LiveId" clId="{BB716CC7-33C1-419F-81E5-9E0428DA5772}" dt="2018-10-09T15:38:56.521" v="72" actId="207"/>
+          <ac:spMkLst>
+            <pc:docMk/>
+            <pc:sldMk cId="583786206" sldId="259"/>
+            <ac:spMk id="21" creationId="{FF8FF875-AE4F-473C-88CB-F91849F7B967}"/>
+          </ac:spMkLst>
+        </pc:spChg>
+        <pc:spChg chg="add del">
+          <ac:chgData name="Edmund Crawley" userId="5604ff08deb8de49" providerId="LiveId" clId="{BB716CC7-33C1-419F-81E5-9E0428DA5772}" dt="2018-10-09T14:59:20.676" v="15" actId="478"/>
+          <ac:spMkLst>
+            <pc:docMk/>
+            <pc:sldMk cId="583786206" sldId="259"/>
+            <ac:spMk id="22" creationId="{1015F3CF-06B9-4558-AF2D-7F312E4F7242}"/>
+          </ac:spMkLst>
+        </pc:spChg>
+        <pc:spChg chg="add del">
+          <ac:chgData name="Edmund Crawley" userId="5604ff08deb8de49" providerId="LiveId" clId="{BB716CC7-33C1-419F-81E5-9E0428DA5772}" dt="2018-10-09T14:59:14.307" v="14" actId="478"/>
+          <ac:spMkLst>
+            <pc:docMk/>
+            <pc:sldMk cId="583786206" sldId="259"/>
+            <ac:spMk id="23" creationId="{7CA78158-80FD-4972-BDAC-C8624495FE73}"/>
+          </ac:spMkLst>
+        </pc:spChg>
+        <pc:spChg chg="add del">
+          <ac:chgData name="Edmund Crawley" userId="5604ff08deb8de49" providerId="LiveId" clId="{BB716CC7-33C1-419F-81E5-9E0428DA5772}" dt="2018-10-09T15:01:03.152" v="31" actId="478"/>
+          <ac:spMkLst>
+            <pc:docMk/>
+            <pc:sldMk cId="583786206" sldId="259"/>
+            <ac:spMk id="24" creationId="{428F8D92-6014-45D2-A427-CF7FAAD675B8}"/>
+          </ac:spMkLst>
+        </pc:spChg>
+        <pc:spChg chg="add del">
+          <ac:chgData name="Edmund Crawley" userId="5604ff08deb8de49" providerId="LiveId" clId="{BB716CC7-33C1-419F-81E5-9E0428DA5772}" dt="2018-10-09T14:59:22.980" v="16" actId="478"/>
+          <ac:spMkLst>
+            <pc:docMk/>
+            <pc:sldMk cId="583786206" sldId="259"/>
+            <ac:spMk id="25" creationId="{0572A765-E8A1-4652-92B7-B4B323606839}"/>
+          </ac:spMkLst>
+        </pc:spChg>
+        <pc:spChg chg="add mod">
+          <ac:chgData name="Edmund Crawley" userId="5604ff08deb8de49" providerId="LiveId" clId="{BB716CC7-33C1-419F-81E5-9E0428DA5772}" dt="2018-10-09T15:47:03.450" v="378" actId="1076"/>
+          <ac:spMkLst>
+            <pc:docMk/>
+            <pc:sldMk cId="583786206" sldId="259"/>
+            <ac:spMk id="34" creationId="{8C115144-6D92-4C59-85A9-AE385C32CB13}"/>
+          </ac:spMkLst>
+        </pc:spChg>
+        <pc:spChg chg="add del mod">
+          <ac:chgData name="Edmund Crawley" userId="5604ff08deb8de49" providerId="LiveId" clId="{BB716CC7-33C1-419F-81E5-9E0428DA5772}" dt="2018-10-09T15:47:25.170" v="379" actId="478"/>
+          <ac:spMkLst>
+            <pc:docMk/>
+            <pc:sldMk cId="583786206" sldId="259"/>
+            <ac:spMk id="35" creationId="{D1C0E809-9612-4E28-8018-875325CD6C8D}"/>
+          </ac:spMkLst>
+        </pc:spChg>
+        <pc:spChg chg="add del mod">
+          <ac:chgData name="Edmund Crawley" userId="5604ff08deb8de49" providerId="LiveId" clId="{BB716CC7-33C1-419F-81E5-9E0428DA5772}" dt="2018-10-09T15:47:28.050" v="380" actId="478"/>
+          <ac:spMkLst>
+            <pc:docMk/>
+            <pc:sldMk cId="583786206" sldId="259"/>
+            <ac:spMk id="36" creationId="{60BAF4D8-59EE-426B-8B56-7DDF0A2EE056}"/>
+          </ac:spMkLst>
+        </pc:spChg>
+        <pc:spChg chg="add mod">
+          <ac:chgData name="Edmund Crawley" userId="5604ff08deb8de49" providerId="LiveId" clId="{BB716CC7-33C1-419F-81E5-9E0428DA5772}" dt="2018-10-09T16:11:21.504" v="845" actId="20577"/>
+          <ac:spMkLst>
+            <pc:docMk/>
+            <pc:sldMk cId="583786206" sldId="259"/>
+            <ac:spMk id="37" creationId="{2FED69CD-B3A5-4524-A737-72D246018063}"/>
+          </ac:spMkLst>
+        </pc:spChg>
+        <pc:spChg chg="add mod">
+          <ac:chgData name="Edmund Crawley" userId="5604ff08deb8de49" providerId="LiveId" clId="{BB716CC7-33C1-419F-81E5-9E0428DA5772}" dt="2018-10-09T15:58:26.811" v="841" actId="1038"/>
+          <ac:spMkLst>
+            <pc:docMk/>
+            <pc:sldMk cId="583786206" sldId="259"/>
+            <ac:spMk id="38" creationId="{9B5DBDB4-B433-4B36-B50F-6CABE14D8AA6}"/>
+          </ac:spMkLst>
+        </pc:spChg>
+        <pc:spChg chg="add mod">
+          <ac:chgData name="Edmund Crawley" userId="5604ff08deb8de49" providerId="LiveId" clId="{BB716CC7-33C1-419F-81E5-9E0428DA5772}" dt="2018-10-09T15:50:20.724" v="827" actId="1076"/>
+          <ac:spMkLst>
+            <pc:docMk/>
+            <pc:sldMk cId="583786206" sldId="259"/>
+            <ac:spMk id="39" creationId="{625E9EF8-7DEA-4426-90E8-1F0D5EEC9F1D}"/>
+          </ac:spMkLst>
+        </pc:spChg>
+        <pc:picChg chg="add del mod ord">
+          <ac:chgData name="Edmund Crawley" userId="5604ff08deb8de49" providerId="LiveId" clId="{BB716CC7-33C1-419F-81E5-9E0428DA5772}" dt="2018-10-09T15:04:41.077" v="35" actId="478"/>
+          <ac:picMkLst>
+            <pc:docMk/>
+            <pc:sldMk cId="583786206" sldId="259"/>
+            <ac:picMk id="4" creationId="{6A90E6E8-9D6A-4AC6-A3AC-36A9DB817563}"/>
+          </ac:picMkLst>
+        </pc:picChg>
+        <pc:picChg chg="add del">
+          <ac:chgData name="Edmund Crawley" userId="5604ff08deb8de49" providerId="LiveId" clId="{BB716CC7-33C1-419F-81E5-9E0428DA5772}" dt="2018-10-09T14:58:49.110" v="7" actId="478"/>
+          <ac:picMkLst>
+            <pc:docMk/>
+            <pc:sldMk cId="583786206" sldId="259"/>
+            <ac:picMk id="7" creationId="{FA6A409A-7A27-408D-A06A-95F997E40CDA}"/>
+          </ac:picMkLst>
+        </pc:picChg>
+        <pc:picChg chg="add mod">
+          <ac:chgData name="Edmund Crawley" userId="5604ff08deb8de49" providerId="LiveId" clId="{BB716CC7-33C1-419F-81E5-9E0428DA5772}" dt="2018-10-09T15:00:12.020" v="25" actId="1038"/>
+          <ac:picMkLst>
+            <pc:docMk/>
+            <pc:sldMk cId="583786206" sldId="259"/>
+            <ac:picMk id="8" creationId="{76464316-5449-4BD5-86C9-4E9B871978CD}"/>
+          </ac:picMkLst>
+        </pc:picChg>
+        <pc:picChg chg="add del">
+          <ac:chgData name="Edmund Crawley" userId="5604ff08deb8de49" providerId="LiveId" clId="{BB716CC7-33C1-419F-81E5-9E0428DA5772}" dt="2018-10-09T15:08:26.183" v="45" actId="478"/>
+          <ac:picMkLst>
+            <pc:docMk/>
+            <pc:sldMk cId="583786206" sldId="259"/>
+            <ac:picMk id="10" creationId="{693C482B-F980-4A1D-97DB-889F7577EC58}"/>
+          </ac:picMkLst>
+        </pc:picChg>
+        <pc:picChg chg="add del mod">
+          <ac:chgData name="Edmund Crawley" userId="5604ff08deb8de49" providerId="LiveId" clId="{BB716CC7-33C1-419F-81E5-9E0428DA5772}" dt="2018-10-09T15:08:24.556" v="44" actId="478"/>
+          <ac:picMkLst>
+            <pc:docMk/>
+            <pc:sldMk cId="583786206" sldId="259"/>
+            <ac:picMk id="18" creationId="{EB191108-D805-4637-B20F-064FC7BAB675}"/>
+          </ac:picMkLst>
+        </pc:picChg>
+        <pc:picChg chg="add mod">
+          <ac:chgData name="Edmund Crawley" userId="5604ff08deb8de49" providerId="LiveId" clId="{BB716CC7-33C1-419F-81E5-9E0428DA5772}" dt="2018-10-09T15:10:13.583" v="52" actId="1076"/>
+          <ac:picMkLst>
+            <pc:docMk/>
+            <pc:sldMk cId="583786206" sldId="259"/>
+            <ac:picMk id="26" creationId="{2D0C0C58-8B01-4ADD-B2E2-078F343ECB51}"/>
+          </ac:picMkLst>
+        </pc:picChg>
+        <pc:picChg chg="add mod">
+          <ac:chgData name="Edmund Crawley" userId="5604ff08deb8de49" providerId="LiveId" clId="{BB716CC7-33C1-419F-81E5-9E0428DA5772}" dt="2018-10-09T15:09:04.648" v="50" actId="14100"/>
+          <ac:picMkLst>
+            <pc:docMk/>
+            <pc:sldMk cId="583786206" sldId="259"/>
+            <ac:picMk id="27" creationId="{A8A20078-8A28-4C37-82BC-7E229CE4577B}"/>
+          </ac:picMkLst>
+        </pc:picChg>
+        <pc:cxnChg chg="add del mod">
+          <ac:chgData name="Edmund Crawley" userId="5604ff08deb8de49" providerId="LiveId" clId="{BB716CC7-33C1-419F-81E5-9E0428DA5772}" dt="2018-10-09T15:33:27.804" v="56" actId="478"/>
+          <ac:cxnSpMkLst>
+            <pc:docMk/>
+            <pc:sldMk cId="583786206" sldId="259"/>
+            <ac:cxnSpMk id="29" creationId="{C44122D1-208C-449B-A28D-1AB68D05706B}"/>
+          </ac:cxnSpMkLst>
+        </pc:cxnChg>
+        <pc:cxnChg chg="add mod">
+          <ac:chgData name="Edmund Crawley" userId="5604ff08deb8de49" providerId="LiveId" clId="{BB716CC7-33C1-419F-81E5-9E0428DA5772}" dt="2018-10-09T15:38:04.727" v="68" actId="692"/>
+          <ac:cxnSpMkLst>
+            <pc:docMk/>
+            <pc:sldMk cId="583786206" sldId="259"/>
+            <ac:cxnSpMk id="31" creationId="{EB50A0AB-1023-4487-8E9A-8AF72B0E311C}"/>
+          </ac:cxnSpMkLst>
+        </pc:cxnChg>
       </pc:sldChg>
     </pc:docChg>
   </pc:docChgLst>
@@ -290,7 +570,7 @@
           <a:p>
             <a:fld id="{23D77BCE-F76E-4A53-B457-B198FEE3CCBD}" type="datetimeFigureOut">
               <a:rPr lang="en-US" smtClean="0"/>
-              <a:t>9/26/2018</a:t>
+              <a:t>10/9/2018</a:t>
             </a:fld>
             <a:endParaRPr lang="en-US"/>
           </a:p>
@@ -488,7 +768,7 @@
           <a:p>
             <a:fld id="{23D77BCE-F76E-4A53-B457-B198FEE3CCBD}" type="datetimeFigureOut">
               <a:rPr lang="en-US" smtClean="0"/>
-              <a:t>9/26/2018</a:t>
+              <a:t>10/9/2018</a:t>
             </a:fld>
             <a:endParaRPr lang="en-US"/>
           </a:p>
@@ -696,7 +976,7 @@
           <a:p>
             <a:fld id="{23D77BCE-F76E-4A53-B457-B198FEE3CCBD}" type="datetimeFigureOut">
               <a:rPr lang="en-US" smtClean="0"/>
-              <a:t>9/26/2018</a:t>
+              <a:t>10/9/2018</a:t>
             </a:fld>
             <a:endParaRPr lang="en-US"/>
           </a:p>
@@ -894,7 +1174,7 @@
           <a:p>
             <a:fld id="{23D77BCE-F76E-4A53-B457-B198FEE3CCBD}" type="datetimeFigureOut">
               <a:rPr lang="en-US" smtClean="0"/>
-              <a:t>9/26/2018</a:t>
+              <a:t>10/9/2018</a:t>
             </a:fld>
             <a:endParaRPr lang="en-US"/>
           </a:p>
@@ -1169,7 +1449,7 @@
           <a:p>
             <a:fld id="{23D77BCE-F76E-4A53-B457-B198FEE3CCBD}" type="datetimeFigureOut">
               <a:rPr lang="en-US" smtClean="0"/>
-              <a:t>9/26/2018</a:t>
+              <a:t>10/9/2018</a:t>
             </a:fld>
             <a:endParaRPr lang="en-US"/>
           </a:p>
@@ -1434,7 +1714,7 @@
           <a:p>
             <a:fld id="{23D77BCE-F76E-4A53-B457-B198FEE3CCBD}" type="datetimeFigureOut">
               <a:rPr lang="en-US" smtClean="0"/>
-              <a:t>9/26/2018</a:t>
+              <a:t>10/9/2018</a:t>
             </a:fld>
             <a:endParaRPr lang="en-US"/>
           </a:p>
@@ -1846,7 +2126,7 @@
           <a:p>
             <a:fld id="{23D77BCE-F76E-4A53-B457-B198FEE3CCBD}" type="datetimeFigureOut">
               <a:rPr lang="en-US" smtClean="0"/>
-              <a:t>9/26/2018</a:t>
+              <a:t>10/9/2018</a:t>
             </a:fld>
             <a:endParaRPr lang="en-US"/>
           </a:p>
@@ -1987,7 +2267,7 @@
           <a:p>
             <a:fld id="{23D77BCE-F76E-4A53-B457-B198FEE3CCBD}" type="datetimeFigureOut">
               <a:rPr lang="en-US" smtClean="0"/>
-              <a:t>9/26/2018</a:t>
+              <a:t>10/9/2018</a:t>
             </a:fld>
             <a:endParaRPr lang="en-US"/>
           </a:p>
@@ -2100,7 +2380,7 @@
           <a:p>
             <a:fld id="{23D77BCE-F76E-4A53-B457-B198FEE3CCBD}" type="datetimeFigureOut">
               <a:rPr lang="en-US" smtClean="0"/>
-              <a:t>9/26/2018</a:t>
+              <a:t>10/9/2018</a:t>
             </a:fld>
             <a:endParaRPr lang="en-US"/>
           </a:p>
@@ -2411,7 +2691,7 @@
           <a:p>
             <a:fld id="{23D77BCE-F76E-4A53-B457-B198FEE3CCBD}" type="datetimeFigureOut">
               <a:rPr lang="en-US" smtClean="0"/>
-              <a:t>9/26/2018</a:t>
+              <a:t>10/9/2018</a:t>
             </a:fld>
             <a:endParaRPr lang="en-US"/>
           </a:p>
@@ -2699,7 +2979,7 @@
           <a:p>
             <a:fld id="{23D77BCE-F76E-4A53-B457-B198FEE3CCBD}" type="datetimeFigureOut">
               <a:rPr lang="en-US" smtClean="0"/>
-              <a:t>9/26/2018</a:t>
+              <a:t>10/9/2018</a:t>
             </a:fld>
             <a:endParaRPr lang="en-US"/>
           </a:p>
@@ -2940,7 +3220,7 @@
           <a:p>
             <a:fld id="{23D77BCE-F76E-4A53-B457-B198FEE3CCBD}" type="datetimeFigureOut">
               <a:rPr lang="en-US" smtClean="0"/>
-              <a:t>9/26/2018</a:t>
+              <a:t>10/9/2018</a:t>
             </a:fld>
             <a:endParaRPr lang="en-US"/>
           </a:p>
@@ -6682,6 +6962,929 @@
 </p:sld>
 </file>
 
+<file path=ppt/slides/slide4.xml><?xml version="1.0" encoding="utf-8"?>
+<p:sld xmlns:a="http://schemas.openxmlformats.org/drawingml/2006/main" xmlns:r="http://schemas.openxmlformats.org/officeDocument/2006/relationships" xmlns:p="http://schemas.openxmlformats.org/presentationml/2006/main">
+  <p:cSld>
+    <p:spTree>
+      <p:nvGrpSpPr>
+        <p:cNvPr id="1" name=""/>
+        <p:cNvGrpSpPr/>
+        <p:nvPr/>
+      </p:nvGrpSpPr>
+      <p:grpSpPr>
+        <a:xfrm>
+          <a:off x="0" y="0"/>
+          <a:ext cx="0" cy="0"/>
+          <a:chOff x="0" y="0"/>
+          <a:chExt cx="0" cy="0"/>
+        </a:xfrm>
+      </p:grpSpPr>
+      <p:sp>
+        <p:nvSpPr>
+          <p:cNvPr id="5" name="Rectangle: Rounded Corners 4">
+            <a:extLst>
+              <a:ext uri="{FF2B5EF4-FFF2-40B4-BE49-F238E27FC236}">
+                <a16:creationId xmlns:a16="http://schemas.microsoft.com/office/drawing/2014/main" id="{D15DDA08-9D9B-4A09-A8F2-5F37E4AC298E}"/>
+              </a:ext>
+            </a:extLst>
+          </p:cNvPr>
+          <p:cNvSpPr/>
+          <p:nvPr/>
+        </p:nvSpPr>
+        <p:spPr>
+          <a:xfrm>
+            <a:off x="1076899" y="1174732"/>
+            <a:ext cx="2474258" cy="2254268"/>
+          </a:xfrm>
+          <a:prstGeom prst="roundRect">
+            <a:avLst/>
+          </a:prstGeom>
+          <a:solidFill>
+            <a:srgbClr val="5EACB6"/>
+          </a:solidFill>
+        </p:spPr>
+        <p:style>
+          <a:lnRef idx="2">
+            <a:schemeClr val="accent1">
+              <a:shade val="50000"/>
+            </a:schemeClr>
+          </a:lnRef>
+          <a:fillRef idx="1">
+            <a:schemeClr val="accent1"/>
+          </a:fillRef>
+          <a:effectRef idx="0">
+            <a:schemeClr val="accent1"/>
+          </a:effectRef>
+          <a:fontRef idx="minor">
+            <a:schemeClr val="lt1"/>
+          </a:fontRef>
+        </p:style>
+        <p:txBody>
+          <a:bodyPr rtlCol="0" anchor="ctr"/>
+          <a:lstStyle/>
+          <a:p>
+            <a:pPr algn="ctr"/>
+            <a:endParaRPr lang="en-US"/>
+          </a:p>
+        </p:txBody>
+      </p:sp>
+      <p:sp>
+        <p:nvSpPr>
+          <p:cNvPr id="6" name="Rectangle: Rounded Corners 5">
+            <a:extLst>
+              <a:ext uri="{FF2B5EF4-FFF2-40B4-BE49-F238E27FC236}">
+                <a16:creationId xmlns:a16="http://schemas.microsoft.com/office/drawing/2014/main" id="{B36BBF4E-BAA4-4333-B128-C32F33D4D71F}"/>
+              </a:ext>
+            </a:extLst>
+          </p:cNvPr>
+          <p:cNvSpPr/>
+          <p:nvPr/>
+        </p:nvSpPr>
+        <p:spPr>
+          <a:xfrm>
+            <a:off x="7557499" y="1128370"/>
+            <a:ext cx="2474258" cy="2300630"/>
+          </a:xfrm>
+          <a:prstGeom prst="roundRect">
+            <a:avLst/>
+          </a:prstGeom>
+          <a:solidFill>
+            <a:srgbClr val="5EACB6"/>
+          </a:solidFill>
+        </p:spPr>
+        <p:style>
+          <a:lnRef idx="2">
+            <a:schemeClr val="accent1">
+              <a:shade val="50000"/>
+            </a:schemeClr>
+          </a:lnRef>
+          <a:fillRef idx="1">
+            <a:schemeClr val="accent1"/>
+          </a:fillRef>
+          <a:effectRef idx="0">
+            <a:schemeClr val="accent1"/>
+          </a:effectRef>
+          <a:fontRef idx="minor">
+            <a:schemeClr val="lt1"/>
+          </a:fontRef>
+        </p:style>
+        <p:txBody>
+          <a:bodyPr rtlCol="0" anchor="ctr"/>
+          <a:lstStyle/>
+          <a:p>
+            <a:pPr algn="ctr"/>
+            <a:endParaRPr lang="en-US"/>
+          </a:p>
+        </p:txBody>
+      </p:sp>
+      <p:pic>
+        <p:nvPicPr>
+          <p:cNvPr id="8" name="Picture 7">
+            <a:extLst>
+              <a:ext uri="{FF2B5EF4-FFF2-40B4-BE49-F238E27FC236}">
+                <a16:creationId xmlns:a16="http://schemas.microsoft.com/office/drawing/2014/main" id="{76464316-5449-4BD5-86C9-4E9B871978CD}"/>
+              </a:ext>
+            </a:extLst>
+          </p:cNvPr>
+          <p:cNvPicPr>
+            <a:picLocks noChangeAspect="1"/>
+          </p:cNvPicPr>
+          <p:nvPr/>
+        </p:nvPicPr>
+        <p:blipFill>
+          <a:blip r:embed="rId2"/>
+          <a:stretch>
+            <a:fillRect/>
+          </a:stretch>
+        </p:blipFill>
+        <p:spPr>
+          <a:xfrm>
+            <a:off x="1194237" y="1301228"/>
+            <a:ext cx="2185988" cy="1922819"/>
+          </a:xfrm>
+          <a:prstGeom prst="rect">
+            <a:avLst/>
+          </a:prstGeom>
+        </p:spPr>
+      </p:pic>
+      <p:sp>
+        <p:nvSpPr>
+          <p:cNvPr id="9" name="Rectangle: Rounded Corners 8">
+            <a:extLst>
+              <a:ext uri="{FF2B5EF4-FFF2-40B4-BE49-F238E27FC236}">
+                <a16:creationId xmlns:a16="http://schemas.microsoft.com/office/drawing/2014/main" id="{4275FF9A-880E-4595-83EF-6CF0DBE68DE9}"/>
+              </a:ext>
+            </a:extLst>
+          </p:cNvPr>
+          <p:cNvSpPr/>
+          <p:nvPr/>
+        </p:nvSpPr>
+        <p:spPr>
+          <a:xfrm>
+            <a:off x="4290420" y="1165764"/>
+            <a:ext cx="2474258" cy="2272203"/>
+          </a:xfrm>
+          <a:prstGeom prst="roundRect">
+            <a:avLst/>
+          </a:prstGeom>
+          <a:solidFill>
+            <a:srgbClr val="5EACB6"/>
+          </a:solidFill>
+        </p:spPr>
+        <p:style>
+          <a:lnRef idx="2">
+            <a:schemeClr val="accent1">
+              <a:shade val="50000"/>
+            </a:schemeClr>
+          </a:lnRef>
+          <a:fillRef idx="1">
+            <a:schemeClr val="accent1"/>
+          </a:fillRef>
+          <a:effectRef idx="0">
+            <a:schemeClr val="accent1"/>
+          </a:effectRef>
+          <a:fontRef idx="minor">
+            <a:schemeClr val="lt1"/>
+          </a:fontRef>
+        </p:style>
+        <p:txBody>
+          <a:bodyPr rtlCol="0" anchor="ctr"/>
+          <a:lstStyle/>
+          <a:p>
+            <a:pPr algn="ctr"/>
+            <a:endParaRPr lang="en-US"/>
+          </a:p>
+        </p:txBody>
+      </p:sp>
+      <p:sp>
+        <p:nvSpPr>
+          <p:cNvPr id="19" name="TextBox 18">
+            <a:extLst>
+              <a:ext uri="{FF2B5EF4-FFF2-40B4-BE49-F238E27FC236}">
+                <a16:creationId xmlns:a16="http://schemas.microsoft.com/office/drawing/2014/main" id="{436CF46A-C488-4D7C-B9E8-0E24163F0B8F}"/>
+              </a:ext>
+            </a:extLst>
+          </p:cNvPr>
+          <p:cNvSpPr txBox="1"/>
+          <p:nvPr/>
+        </p:nvSpPr>
+        <p:spPr>
+          <a:xfrm>
+            <a:off x="4628403" y="535218"/>
+            <a:ext cx="1903025" cy="369332"/>
+          </a:xfrm>
+          <a:prstGeom prst="rect">
+            <a:avLst/>
+          </a:prstGeom>
+          <a:noFill/>
+        </p:spPr>
+        <p:txBody>
+          <a:bodyPr wrap="square" rtlCol="0">
+            <a:spAutoFit/>
+          </a:bodyPr>
+          <a:lstStyle/>
+          <a:p>
+            <a:r>
+              <a:rPr lang="en-US" dirty="0"/>
+              <a:t>Interest Rate Hike</a:t>
+            </a:r>
+          </a:p>
+        </p:txBody>
+      </p:sp>
+      <p:sp>
+        <p:nvSpPr>
+          <p:cNvPr id="20" name="TextBox 19">
+            <a:extLst>
+              <a:ext uri="{FF2B5EF4-FFF2-40B4-BE49-F238E27FC236}">
+                <a16:creationId xmlns:a16="http://schemas.microsoft.com/office/drawing/2014/main" id="{C27495A8-903F-487F-B981-56ECA6C9A964}"/>
+              </a:ext>
+            </a:extLst>
+          </p:cNvPr>
+          <p:cNvSpPr txBox="1"/>
+          <p:nvPr/>
+        </p:nvSpPr>
+        <p:spPr>
+          <a:xfrm>
+            <a:off x="2314028" y="511124"/>
+            <a:ext cx="420090" cy="369332"/>
+          </a:xfrm>
+          <a:prstGeom prst="rect">
+            <a:avLst/>
+          </a:prstGeom>
+          <a:noFill/>
+        </p:spPr>
+        <p:txBody>
+          <a:bodyPr wrap="square" rtlCol="0">
+            <a:spAutoFit/>
+          </a:bodyPr>
+          <a:lstStyle/>
+          <a:p>
+            <a:r>
+              <a:rPr lang="en-US" dirty="0"/>
+              <a:t>$$</a:t>
+            </a:r>
+          </a:p>
+        </p:txBody>
+      </p:sp>
+      <p:sp>
+        <p:nvSpPr>
+          <p:cNvPr id="21" name="TextBox 20">
+            <a:extLst>
+              <a:ext uri="{FF2B5EF4-FFF2-40B4-BE49-F238E27FC236}">
+                <a16:creationId xmlns:a16="http://schemas.microsoft.com/office/drawing/2014/main" id="{FF8FF875-AE4F-473C-88CB-F91849F7B967}"/>
+              </a:ext>
+            </a:extLst>
+          </p:cNvPr>
+          <p:cNvSpPr txBox="1"/>
+          <p:nvPr/>
+        </p:nvSpPr>
+        <p:spPr>
+          <a:xfrm>
+            <a:off x="8374537" y="503205"/>
+            <a:ext cx="420090" cy="369332"/>
+          </a:xfrm>
+          <a:prstGeom prst="rect">
+            <a:avLst/>
+          </a:prstGeom>
+          <a:noFill/>
+        </p:spPr>
+        <p:txBody>
+          <a:bodyPr wrap="square" rtlCol="0">
+            <a:spAutoFit/>
+          </a:bodyPr>
+          <a:lstStyle/>
+          <a:p>
+            <a:r>
+              <a:rPr lang="en-US" dirty="0">
+                <a:solidFill>
+                  <a:schemeClr val="accent4">
+                    <a:lumMod val="75000"/>
+                  </a:schemeClr>
+                </a:solidFill>
+              </a:rPr>
+              <a:t>$$</a:t>
+            </a:r>
+          </a:p>
+        </p:txBody>
+      </p:sp>
+      <p:pic>
+        <p:nvPicPr>
+          <p:cNvPr id="26" name="Picture 25">
+            <a:extLst>
+              <a:ext uri="{FF2B5EF4-FFF2-40B4-BE49-F238E27FC236}">
+                <a16:creationId xmlns:a16="http://schemas.microsoft.com/office/drawing/2014/main" id="{2D0C0C58-8B01-4ADD-B2E2-078F343ECB51}"/>
+              </a:ext>
+            </a:extLst>
+          </p:cNvPr>
+          <p:cNvPicPr>
+            <a:picLocks noChangeAspect="1"/>
+          </p:cNvPicPr>
+          <p:nvPr/>
+        </p:nvPicPr>
+        <p:blipFill>
+          <a:blip r:embed="rId3"/>
+          <a:stretch>
+            <a:fillRect/>
+          </a:stretch>
+        </p:blipFill>
+        <p:spPr>
+          <a:xfrm>
+            <a:off x="7604576" y="1465941"/>
+            <a:ext cx="2380103" cy="1625487"/>
+          </a:xfrm>
+          <a:prstGeom prst="rect">
+            <a:avLst/>
+          </a:prstGeom>
+        </p:spPr>
+      </p:pic>
+      <p:pic>
+        <p:nvPicPr>
+          <p:cNvPr id="27" name="Picture 26">
+            <a:extLst>
+              <a:ext uri="{FF2B5EF4-FFF2-40B4-BE49-F238E27FC236}">
+                <a16:creationId xmlns:a16="http://schemas.microsoft.com/office/drawing/2014/main" id="{A8A20078-8A28-4C37-82BC-7E229CE4577B}"/>
+              </a:ext>
+            </a:extLst>
+          </p:cNvPr>
+          <p:cNvPicPr>
+            <a:picLocks noChangeAspect="1"/>
+          </p:cNvPicPr>
+          <p:nvPr/>
+        </p:nvPicPr>
+        <p:blipFill>
+          <a:blip r:embed="rId4"/>
+          <a:stretch>
+            <a:fillRect/>
+          </a:stretch>
+        </p:blipFill>
+        <p:spPr>
+          <a:xfrm>
+            <a:off x="4309035" y="1174733"/>
+            <a:ext cx="2021974" cy="2002020"/>
+          </a:xfrm>
+          <a:prstGeom prst="rect">
+            <a:avLst/>
+          </a:prstGeom>
+        </p:spPr>
+      </p:pic>
+      <p:cxnSp>
+        <p:nvCxnSpPr>
+          <p:cNvPr id="31" name="Connector: Curved 30">
+            <a:extLst>
+              <a:ext uri="{FF2B5EF4-FFF2-40B4-BE49-F238E27FC236}">
+                <a16:creationId xmlns:a16="http://schemas.microsoft.com/office/drawing/2014/main" id="{EB50A0AB-1023-4487-8E9A-8AF72B0E311C}"/>
+              </a:ext>
+            </a:extLst>
+          </p:cNvPr>
+          <p:cNvCxnSpPr>
+            <a:cxnSpLocks/>
+            <a:stCxn id="5" idx="0"/>
+            <a:endCxn id="6" idx="0"/>
+          </p:cNvCxnSpPr>
+          <p:nvPr/>
+        </p:nvCxnSpPr>
+        <p:spPr>
+          <a:xfrm rot="5400000" flipH="1" flipV="1">
+            <a:off x="5531147" y="-2088749"/>
+            <a:ext cx="46362" cy="6480600"/>
+          </a:xfrm>
+          <a:prstGeom prst="curvedConnector3">
+            <a:avLst>
+              <a:gd name="adj1" fmla="val 1528219"/>
+            </a:avLst>
+          </a:prstGeom>
+          <a:ln w="76200">
+            <a:gradFill>
+              <a:gsLst>
+                <a:gs pos="0">
+                  <a:schemeClr val="tx1">
+                    <a:lumMod val="95000"/>
+                    <a:lumOff val="5000"/>
+                  </a:schemeClr>
+                </a:gs>
+                <a:gs pos="100000">
+                  <a:schemeClr val="accent4">
+                    <a:lumMod val="75000"/>
+                  </a:schemeClr>
+                </a:gs>
+              </a:gsLst>
+              <a:lin ang="5400000" scaled="1"/>
+            </a:gradFill>
+            <a:tailEnd type="triangle"/>
+          </a:ln>
+        </p:spPr>
+        <p:style>
+          <a:lnRef idx="1">
+            <a:schemeClr val="accent1"/>
+          </a:lnRef>
+          <a:fillRef idx="0">
+            <a:schemeClr val="accent1"/>
+          </a:fillRef>
+          <a:effectRef idx="0">
+            <a:schemeClr val="accent1"/>
+          </a:effectRef>
+          <a:fontRef idx="minor">
+            <a:schemeClr val="tx1"/>
+          </a:fontRef>
+        </p:style>
+      </p:cxnSp>
+      <p:sp>
+        <p:nvSpPr>
+          <p:cNvPr id="34" name="TextBox 33">
+            <a:extLst>
+              <a:ext uri="{FF2B5EF4-FFF2-40B4-BE49-F238E27FC236}">
+                <a16:creationId xmlns:a16="http://schemas.microsoft.com/office/drawing/2014/main" id="{8C115144-6D92-4C59-85A9-AE385C32CB13}"/>
+              </a:ext>
+            </a:extLst>
+          </p:cNvPr>
+          <p:cNvSpPr txBox="1"/>
+          <p:nvPr/>
+        </p:nvSpPr>
+        <p:spPr>
+          <a:xfrm>
+            <a:off x="1497431" y="3555496"/>
+            <a:ext cx="1633193" cy="707886"/>
+          </a:xfrm>
+          <a:prstGeom prst="rect">
+            <a:avLst/>
+          </a:prstGeom>
+          <a:noFill/>
+        </p:spPr>
+        <p:txBody>
+          <a:bodyPr wrap="square" rtlCol="0">
+            <a:spAutoFit/>
+          </a:bodyPr>
+          <a:lstStyle/>
+          <a:p>
+            <a:pPr algn="ctr"/>
+            <a:r>
+              <a:rPr lang="en-US" sz="2000" dirty="0"/>
+              <a:t>Medium MPX ≈ 0.5</a:t>
+            </a:r>
+          </a:p>
+        </p:txBody>
+      </p:sp>
+      <p:sp>
+        <p:nvSpPr>
+          <p:cNvPr id="37" name="TextBox 36">
+            <a:extLst>
+              <a:ext uri="{FF2B5EF4-FFF2-40B4-BE49-F238E27FC236}">
+                <a16:creationId xmlns:a16="http://schemas.microsoft.com/office/drawing/2014/main" id="{2FED69CD-B3A5-4524-A737-72D246018063}"/>
+              </a:ext>
+            </a:extLst>
+          </p:cNvPr>
+          <p:cNvSpPr txBox="1"/>
+          <p:nvPr/>
+        </p:nvSpPr>
+        <p:spPr>
+          <a:xfrm>
+            <a:off x="4780083" y="3553080"/>
+            <a:ext cx="1633193" cy="707886"/>
+          </a:xfrm>
+          <a:prstGeom prst="rect">
+            <a:avLst/>
+          </a:prstGeom>
+          <a:noFill/>
+        </p:spPr>
+        <p:txBody>
+          <a:bodyPr wrap="square" rtlCol="0">
+            <a:spAutoFit/>
+          </a:bodyPr>
+          <a:lstStyle/>
+          <a:p>
+            <a:pPr algn="ctr"/>
+            <a:r>
+              <a:rPr lang="en-US" sz="2000" dirty="0"/>
+              <a:t>High MPX </a:t>
+            </a:r>
+          </a:p>
+          <a:p>
+            <a:pPr algn="ctr"/>
+            <a:r>
+              <a:rPr lang="en-US" sz="2000" dirty="0"/>
+              <a:t>≈ 0.8</a:t>
+            </a:r>
+          </a:p>
+        </p:txBody>
+      </p:sp>
+      <p:sp>
+        <p:nvSpPr>
+          <p:cNvPr id="38" name="TextBox 37">
+            <a:extLst>
+              <a:ext uri="{FF2B5EF4-FFF2-40B4-BE49-F238E27FC236}">
+                <a16:creationId xmlns:a16="http://schemas.microsoft.com/office/drawing/2014/main" id="{9B5DBDB4-B433-4B36-B50F-6CABE14D8AA6}"/>
+              </a:ext>
+            </a:extLst>
+          </p:cNvPr>
+          <p:cNvSpPr txBox="1"/>
+          <p:nvPr/>
+        </p:nvSpPr>
+        <p:spPr>
+          <a:xfrm>
+            <a:off x="8048218" y="3555502"/>
+            <a:ext cx="1633193" cy="707886"/>
+          </a:xfrm>
+          <a:prstGeom prst="rect">
+            <a:avLst/>
+          </a:prstGeom>
+          <a:noFill/>
+        </p:spPr>
+        <p:txBody>
+          <a:bodyPr wrap="square" rtlCol="0">
+            <a:spAutoFit/>
+          </a:bodyPr>
+          <a:lstStyle/>
+          <a:p>
+            <a:pPr algn="ctr"/>
+            <a:r>
+              <a:rPr lang="en-US" sz="2000" dirty="0"/>
+              <a:t>Low MPX </a:t>
+            </a:r>
+          </a:p>
+          <a:p>
+            <a:pPr algn="ctr"/>
+            <a:r>
+              <a:rPr lang="en-US" sz="2000" dirty="0"/>
+              <a:t>≈ 0.25</a:t>
+            </a:r>
+          </a:p>
+        </p:txBody>
+      </p:sp>
+      <p:sp>
+        <p:nvSpPr>
+          <p:cNvPr id="39" name="TextBox 38">
+            <a:extLst>
+              <a:ext uri="{FF2B5EF4-FFF2-40B4-BE49-F238E27FC236}">
+                <a16:creationId xmlns:a16="http://schemas.microsoft.com/office/drawing/2014/main" id="{625E9EF8-7DEA-4426-90E8-1F0D5EEC9F1D}"/>
+              </a:ext>
+            </a:extLst>
+          </p:cNvPr>
+          <p:cNvSpPr txBox="1"/>
+          <p:nvPr/>
+        </p:nvSpPr>
+        <p:spPr>
+          <a:xfrm>
+            <a:off x="725755" y="4376079"/>
+            <a:ext cx="6607888" cy="400110"/>
+          </a:xfrm>
+          <a:prstGeom prst="rect">
+            <a:avLst/>
+          </a:prstGeom>
+          <a:noFill/>
+        </p:spPr>
+        <p:txBody>
+          <a:bodyPr wrap="square" rtlCol="0">
+            <a:spAutoFit/>
+          </a:bodyPr>
+          <a:lstStyle/>
+          <a:p>
+            <a:pPr algn="ctr"/>
+            <a:r>
+              <a:rPr lang="en-US" sz="2000" dirty="0"/>
+              <a:t>MPX: Marginal Propensity to </a:t>
+            </a:r>
+            <a:r>
+              <a:rPr lang="en-US" sz="2000" dirty="0" err="1"/>
+              <a:t>eXpend</a:t>
+            </a:r>
+            <a:r>
+              <a:rPr lang="en-US" sz="2000" dirty="0"/>
+              <a:t> (includes durables)</a:t>
+            </a:r>
+          </a:p>
+        </p:txBody>
+      </p:sp>
+    </p:spTree>
+    <p:extLst>
+      <p:ext uri="{BB962C8B-B14F-4D97-AF65-F5344CB8AC3E}">
+        <p14:creationId xmlns:p14="http://schemas.microsoft.com/office/powerpoint/2010/main" val="583786206"/>
+      </p:ext>
+    </p:extLst>
+  </p:cSld>
+  <p:clrMapOvr>
+    <a:masterClrMapping/>
+  </p:clrMapOvr>
+  <p:timing>
+    <p:tnLst>
+      <p:par>
+        <p:cTn id="1" dur="indefinite" restart="never" nodeType="tmRoot">
+          <p:childTnLst>
+            <p:seq concurrent="1" nextAc="seek">
+              <p:cTn id="2" dur="indefinite" nodeType="mainSeq">
+                <p:childTnLst>
+                  <p:par>
+                    <p:cTn id="3" fill="hold">
+                      <p:stCondLst>
+                        <p:cond delay="indefinite"/>
+                      </p:stCondLst>
+                      <p:childTnLst>
+                        <p:par>
+                          <p:cTn id="4" fill="hold">
+                            <p:stCondLst>
+                              <p:cond delay="0"/>
+                            </p:stCondLst>
+                            <p:childTnLst>
+                              <p:par>
+                                <p:cTn id="5" presetID="1" presetClass="entr" presetSubtype="0" fill="hold" grpId="0" nodeType="clickEffect">
+                                  <p:stCondLst>
+                                    <p:cond delay="0"/>
+                                  </p:stCondLst>
+                                  <p:childTnLst>
+                                    <p:set>
+                                      <p:cBhvr>
+                                        <p:cTn id="6" dur="1" fill="hold">
+                                          <p:stCondLst>
+                                            <p:cond delay="0"/>
+                                          </p:stCondLst>
+                                        </p:cTn>
+                                        <p:tgtEl>
+                                          <p:spTgt spid="19"/>
+                                        </p:tgtEl>
+                                        <p:attrNameLst>
+                                          <p:attrName>style.visibility</p:attrName>
+                                        </p:attrNameLst>
+                                      </p:cBhvr>
+                                      <p:to>
+                                        <p:strVal val="visible"/>
+                                      </p:to>
+                                    </p:set>
+                                  </p:childTnLst>
+                                </p:cTn>
+                              </p:par>
+                              <p:par>
+                                <p:cTn id="7" presetID="1" presetClass="entr" presetSubtype="0" fill="hold" grpId="0" nodeType="withEffect">
+                                  <p:stCondLst>
+                                    <p:cond delay="0"/>
+                                  </p:stCondLst>
+                                  <p:childTnLst>
+                                    <p:set>
+                                      <p:cBhvr>
+                                        <p:cTn id="8" dur="1" fill="hold">
+                                          <p:stCondLst>
+                                            <p:cond delay="0"/>
+                                          </p:stCondLst>
+                                        </p:cTn>
+                                        <p:tgtEl>
+                                          <p:spTgt spid="20"/>
+                                        </p:tgtEl>
+                                        <p:attrNameLst>
+                                          <p:attrName>style.visibility</p:attrName>
+                                        </p:attrNameLst>
+                                      </p:cBhvr>
+                                      <p:to>
+                                        <p:strVal val="visible"/>
+                                      </p:to>
+                                    </p:set>
+                                  </p:childTnLst>
+                                </p:cTn>
+                              </p:par>
+                              <p:par>
+                                <p:cTn id="9" presetID="1" presetClass="entr" presetSubtype="0" fill="hold" grpId="0" nodeType="withEffect">
+                                  <p:stCondLst>
+                                    <p:cond delay="0"/>
+                                  </p:stCondLst>
+                                  <p:childTnLst>
+                                    <p:set>
+                                      <p:cBhvr>
+                                        <p:cTn id="10" dur="1" fill="hold">
+                                          <p:stCondLst>
+                                            <p:cond delay="0"/>
+                                          </p:stCondLst>
+                                        </p:cTn>
+                                        <p:tgtEl>
+                                          <p:spTgt spid="21"/>
+                                        </p:tgtEl>
+                                        <p:attrNameLst>
+                                          <p:attrName>style.visibility</p:attrName>
+                                        </p:attrNameLst>
+                                      </p:cBhvr>
+                                      <p:to>
+                                        <p:strVal val="visible"/>
+                                      </p:to>
+                                    </p:set>
+                                  </p:childTnLst>
+                                </p:cTn>
+                              </p:par>
+                            </p:childTnLst>
+                          </p:cTn>
+                        </p:par>
+                      </p:childTnLst>
+                    </p:cTn>
+                  </p:par>
+                  <p:par>
+                    <p:cTn id="11" fill="hold">
+                      <p:stCondLst>
+                        <p:cond delay="indefinite"/>
+                      </p:stCondLst>
+                      <p:childTnLst>
+                        <p:par>
+                          <p:cTn id="12" fill="hold">
+                            <p:stCondLst>
+                              <p:cond delay="0"/>
+                            </p:stCondLst>
+                            <p:childTnLst>
+                              <p:par>
+                                <p:cTn id="13" presetID="1" presetClass="entr" presetSubtype="0" fill="hold" grpId="0" nodeType="clickEffect">
+                                  <p:stCondLst>
+                                    <p:cond delay="0"/>
+                                  </p:stCondLst>
+                                  <p:childTnLst>
+                                    <p:set>
+                                      <p:cBhvr>
+                                        <p:cTn id="14" dur="1" fill="hold">
+                                          <p:stCondLst>
+                                            <p:cond delay="0"/>
+                                          </p:stCondLst>
+                                        </p:cTn>
+                                        <p:tgtEl>
+                                          <p:spTgt spid="34"/>
+                                        </p:tgtEl>
+                                        <p:attrNameLst>
+                                          <p:attrName>style.visibility</p:attrName>
+                                        </p:attrNameLst>
+                                      </p:cBhvr>
+                                      <p:to>
+                                        <p:strVal val="visible"/>
+                                      </p:to>
+                                    </p:set>
+                                  </p:childTnLst>
+                                </p:cTn>
+                              </p:par>
+                            </p:childTnLst>
+                          </p:cTn>
+                        </p:par>
+                      </p:childTnLst>
+                    </p:cTn>
+                  </p:par>
+                  <p:par>
+                    <p:cTn id="15" fill="hold">
+                      <p:stCondLst>
+                        <p:cond delay="indefinite"/>
+                      </p:stCondLst>
+                      <p:childTnLst>
+                        <p:par>
+                          <p:cTn id="16" fill="hold">
+                            <p:stCondLst>
+                              <p:cond delay="0"/>
+                            </p:stCondLst>
+                            <p:childTnLst>
+                              <p:par>
+                                <p:cTn id="17" presetID="1" presetClass="entr" presetSubtype="0" fill="hold" grpId="0" nodeType="clickEffect">
+                                  <p:stCondLst>
+                                    <p:cond delay="0"/>
+                                  </p:stCondLst>
+                                  <p:childTnLst>
+                                    <p:set>
+                                      <p:cBhvr>
+                                        <p:cTn id="18" dur="1" fill="hold">
+                                          <p:stCondLst>
+                                            <p:cond delay="0"/>
+                                          </p:stCondLst>
+                                        </p:cTn>
+                                        <p:tgtEl>
+                                          <p:spTgt spid="37"/>
+                                        </p:tgtEl>
+                                        <p:attrNameLst>
+                                          <p:attrName>style.visibility</p:attrName>
+                                        </p:attrNameLst>
+                                      </p:cBhvr>
+                                      <p:to>
+                                        <p:strVal val="visible"/>
+                                      </p:to>
+                                    </p:set>
+                                  </p:childTnLst>
+                                </p:cTn>
+                              </p:par>
+                            </p:childTnLst>
+                          </p:cTn>
+                        </p:par>
+                      </p:childTnLst>
+                    </p:cTn>
+                  </p:par>
+                  <p:par>
+                    <p:cTn id="19" fill="hold">
+                      <p:stCondLst>
+                        <p:cond delay="indefinite"/>
+                      </p:stCondLst>
+                      <p:childTnLst>
+                        <p:par>
+                          <p:cTn id="20" fill="hold">
+                            <p:stCondLst>
+                              <p:cond delay="0"/>
+                            </p:stCondLst>
+                            <p:childTnLst>
+                              <p:par>
+                                <p:cTn id="21" presetID="1" presetClass="entr" presetSubtype="0" fill="hold" grpId="0" nodeType="clickEffect">
+                                  <p:stCondLst>
+                                    <p:cond delay="0"/>
+                                  </p:stCondLst>
+                                  <p:childTnLst>
+                                    <p:set>
+                                      <p:cBhvr>
+                                        <p:cTn id="22" dur="1" fill="hold">
+                                          <p:stCondLst>
+                                            <p:cond delay="0"/>
+                                          </p:stCondLst>
+                                        </p:cTn>
+                                        <p:tgtEl>
+                                          <p:spTgt spid="38"/>
+                                        </p:tgtEl>
+                                        <p:attrNameLst>
+                                          <p:attrName>style.visibility</p:attrName>
+                                        </p:attrNameLst>
+                                      </p:cBhvr>
+                                      <p:to>
+                                        <p:strVal val="visible"/>
+                                      </p:to>
+                                    </p:set>
+                                  </p:childTnLst>
+                                </p:cTn>
+                              </p:par>
+                            </p:childTnLst>
+                          </p:cTn>
+                        </p:par>
+                      </p:childTnLst>
+                    </p:cTn>
+                  </p:par>
+                  <p:par>
+                    <p:cTn id="23" fill="hold">
+                      <p:stCondLst>
+                        <p:cond delay="indefinite"/>
+                      </p:stCondLst>
+                      <p:childTnLst>
+                        <p:par>
+                          <p:cTn id="24" fill="hold">
+                            <p:stCondLst>
+                              <p:cond delay="0"/>
+                            </p:stCondLst>
+                            <p:childTnLst>
+                              <p:par>
+                                <p:cTn id="25" presetID="1" presetClass="entr" presetSubtype="0" fill="hold" grpId="0" nodeType="clickEffect">
+                                  <p:stCondLst>
+                                    <p:cond delay="0"/>
+                                  </p:stCondLst>
+                                  <p:childTnLst>
+                                    <p:set>
+                                      <p:cBhvr>
+                                        <p:cTn id="26" dur="1" fill="hold">
+                                          <p:stCondLst>
+                                            <p:cond delay="0"/>
+                                          </p:stCondLst>
+                                        </p:cTn>
+                                        <p:tgtEl>
+                                          <p:spTgt spid="39"/>
+                                        </p:tgtEl>
+                                        <p:attrNameLst>
+                                          <p:attrName>style.visibility</p:attrName>
+                                        </p:attrNameLst>
+                                      </p:cBhvr>
+                                      <p:to>
+                                        <p:strVal val="visible"/>
+                                      </p:to>
+                                    </p:set>
+                                  </p:childTnLst>
+                                </p:cTn>
+                              </p:par>
+                            </p:childTnLst>
+                          </p:cTn>
+                        </p:par>
+                      </p:childTnLst>
+                    </p:cTn>
+                  </p:par>
+                </p:childTnLst>
+              </p:cTn>
+              <p:prevCondLst>
+                <p:cond evt="onPrev" delay="0">
+                  <p:tgtEl>
+                    <p:sldTgt/>
+                  </p:tgtEl>
+                </p:cond>
+              </p:prevCondLst>
+              <p:nextCondLst>
+                <p:cond evt="onNext" delay="0">
+                  <p:tgtEl>
+                    <p:sldTgt/>
+                  </p:tgtEl>
+                </p:cond>
+              </p:nextCondLst>
+            </p:seq>
+          </p:childTnLst>
+        </p:cTn>
+      </p:par>
+    </p:tnLst>
+    <p:bldLst>
+      <p:bldP spid="19" grpId="0"/>
+      <p:bldP spid="20" grpId="0"/>
+      <p:bldP spid="21" grpId="0"/>
+      <p:bldP spid="34" grpId="0"/>
+      <p:bldP spid="37" grpId="0"/>
+      <p:bldP spid="38" grpId="0"/>
+      <p:bldP spid="39" grpId="0"/>
+    </p:bldLst>
+  </p:timing>
+</p:sld>
+</file>
+
 <file path=ppt/theme/theme1.xml><?xml version="1.0" encoding="utf-8"?>
 <a:theme xmlns:a="http://schemas.openxmlformats.org/drawingml/2006/main" name="Office Theme">
   <a:themeElements>

</xml_diff>